<commit_message>
upd pres: frameworks and code examples cuda + ocl
</commit_message>
<xml_diff>
--- a/presentations/Вычисления на GPU.pptx
+++ b/presentations/Вычисления на GPU.pptx
@@ -13,6 +13,19 @@
     <p:sldId id="263" r:id="rId7"/>
     <p:sldId id="261" r:id="rId8"/>
     <p:sldId id="262" r:id="rId9"/>
+    <p:sldId id="264" r:id="rId10"/>
+    <p:sldId id="265" r:id="rId11"/>
+    <p:sldId id="266" r:id="rId12"/>
+    <p:sldId id="267" r:id="rId13"/>
+    <p:sldId id="268" r:id="rId14"/>
+    <p:sldId id="269" r:id="rId15"/>
+    <p:sldId id="270" r:id="rId16"/>
+    <p:sldId id="271" r:id="rId17"/>
+    <p:sldId id="272" r:id="rId18"/>
+    <p:sldId id="273" r:id="rId19"/>
+    <p:sldId id="274" r:id="rId20"/>
+    <p:sldId id="275" r:id="rId21"/>
+    <p:sldId id="276" r:id="rId22"/>
   </p:sldIdLst>
   <p:sldSz cx="12192000" cy="6858000"/>
   <p:notesSz cx="6858000" cy="9144000"/>
@@ -111,6 +124,11 @@
       </a:defRPr>
     </a:lvl9pPr>
   </p:defaultTextStyle>
+  <p:extLst>
+    <p:ext uri="{EFAFB233-063F-42B5-8137-9DF3F51BA10A}">
+      <p15:sldGuideLst xmlns:p15="http://schemas.microsoft.com/office/powerpoint/2012/main"/>
+    </p:ext>
+  </p:extLst>
 </p:presentation>
 </file>
 
@@ -261,7 +279,7 @@
           <a:p>
             <a:fld id="{D71B6A8A-3F5D-4577-89C1-C90FB1FD3A96}" type="datetimeFigureOut">
               <a:rPr lang="ru-RU" smtClean="0"/>
-              <a:t>17.02.2025</a:t>
+              <a:t>23.02.2025</a:t>
             </a:fld>
             <a:endParaRPr lang="ru-RU"/>
           </a:p>
@@ -459,7 +477,7 @@
           <a:p>
             <a:fld id="{D71B6A8A-3F5D-4577-89C1-C90FB1FD3A96}" type="datetimeFigureOut">
               <a:rPr lang="ru-RU" smtClean="0"/>
-              <a:t>17.02.2025</a:t>
+              <a:t>23.02.2025</a:t>
             </a:fld>
             <a:endParaRPr lang="ru-RU"/>
           </a:p>
@@ -667,7 +685,7 @@
           <a:p>
             <a:fld id="{D71B6A8A-3F5D-4577-89C1-C90FB1FD3A96}" type="datetimeFigureOut">
               <a:rPr lang="ru-RU" smtClean="0"/>
-              <a:t>17.02.2025</a:t>
+              <a:t>23.02.2025</a:t>
             </a:fld>
             <a:endParaRPr lang="ru-RU"/>
           </a:p>
@@ -865,7 +883,7 @@
           <a:p>
             <a:fld id="{D71B6A8A-3F5D-4577-89C1-C90FB1FD3A96}" type="datetimeFigureOut">
               <a:rPr lang="ru-RU" smtClean="0"/>
-              <a:t>17.02.2025</a:t>
+              <a:t>23.02.2025</a:t>
             </a:fld>
             <a:endParaRPr lang="ru-RU"/>
           </a:p>
@@ -1140,7 +1158,7 @@
           <a:p>
             <a:fld id="{D71B6A8A-3F5D-4577-89C1-C90FB1FD3A96}" type="datetimeFigureOut">
               <a:rPr lang="ru-RU" smtClean="0"/>
-              <a:t>17.02.2025</a:t>
+              <a:t>23.02.2025</a:t>
             </a:fld>
             <a:endParaRPr lang="ru-RU"/>
           </a:p>
@@ -1405,7 +1423,7 @@
           <a:p>
             <a:fld id="{D71B6A8A-3F5D-4577-89C1-C90FB1FD3A96}" type="datetimeFigureOut">
               <a:rPr lang="ru-RU" smtClean="0"/>
-              <a:t>17.02.2025</a:t>
+              <a:t>23.02.2025</a:t>
             </a:fld>
             <a:endParaRPr lang="ru-RU"/>
           </a:p>
@@ -1817,7 +1835,7 @@
           <a:p>
             <a:fld id="{D71B6A8A-3F5D-4577-89C1-C90FB1FD3A96}" type="datetimeFigureOut">
               <a:rPr lang="ru-RU" smtClean="0"/>
-              <a:t>17.02.2025</a:t>
+              <a:t>23.02.2025</a:t>
             </a:fld>
             <a:endParaRPr lang="ru-RU"/>
           </a:p>
@@ -1958,7 +1976,7 @@
           <a:p>
             <a:fld id="{D71B6A8A-3F5D-4577-89C1-C90FB1FD3A96}" type="datetimeFigureOut">
               <a:rPr lang="ru-RU" smtClean="0"/>
-              <a:t>17.02.2025</a:t>
+              <a:t>23.02.2025</a:t>
             </a:fld>
             <a:endParaRPr lang="ru-RU"/>
           </a:p>
@@ -2071,7 +2089,7 @@
           <a:p>
             <a:fld id="{D71B6A8A-3F5D-4577-89C1-C90FB1FD3A96}" type="datetimeFigureOut">
               <a:rPr lang="ru-RU" smtClean="0"/>
-              <a:t>17.02.2025</a:t>
+              <a:t>23.02.2025</a:t>
             </a:fld>
             <a:endParaRPr lang="ru-RU"/>
           </a:p>
@@ -2382,7 +2400,7 @@
           <a:p>
             <a:fld id="{D71B6A8A-3F5D-4577-89C1-C90FB1FD3A96}" type="datetimeFigureOut">
               <a:rPr lang="ru-RU" smtClean="0"/>
-              <a:t>17.02.2025</a:t>
+              <a:t>23.02.2025</a:t>
             </a:fld>
             <a:endParaRPr lang="ru-RU"/>
           </a:p>
@@ -2670,7 +2688,7 @@
           <a:p>
             <a:fld id="{D71B6A8A-3F5D-4577-89C1-C90FB1FD3A96}" type="datetimeFigureOut">
               <a:rPr lang="ru-RU" smtClean="0"/>
-              <a:t>17.02.2025</a:t>
+              <a:t>23.02.2025</a:t>
             </a:fld>
             <a:endParaRPr lang="ru-RU"/>
           </a:p>
@@ -2911,7 +2929,7 @@
           <a:p>
             <a:fld id="{D71B6A8A-3F5D-4577-89C1-C90FB1FD3A96}" type="datetimeFigureOut">
               <a:rPr lang="ru-RU" smtClean="0"/>
-              <a:t>17.02.2025</a:t>
+              <a:t>23.02.2025</a:t>
             </a:fld>
             <a:endParaRPr lang="ru-RU"/>
           </a:p>
@@ -3351,7 +3369,7 @@
           <a:p>
             <a:r>
               <a:rPr lang="ru-RU" dirty="0"/>
-              <a:t>Введение в </a:t>
+              <a:t>Вычисления на </a:t>
             </a:r>
             <a:r>
               <a:rPr lang="en-US" dirty="0"/>
@@ -3390,6 +3408,2024 @@
     <p:extLst>
       <p:ext uri="{BB962C8B-B14F-4D97-AF65-F5344CB8AC3E}">
         <p14:creationId xmlns:p14="http://schemas.microsoft.com/office/powerpoint/2010/main" val="1242451939"/>
+      </p:ext>
+    </p:extLst>
+  </p:cSld>
+  <p:clrMapOvr>
+    <a:masterClrMapping/>
+  </p:clrMapOvr>
+</p:sld>
+</file>
+
+<file path=ppt/slides/slide10.xml><?xml version="1.0" encoding="utf-8"?>
+<p:sld xmlns:a="http://schemas.openxmlformats.org/drawingml/2006/main" xmlns:r="http://schemas.openxmlformats.org/officeDocument/2006/relationships" xmlns:p="http://schemas.openxmlformats.org/presentationml/2006/main">
+  <p:cSld>
+    <p:spTree>
+      <p:nvGrpSpPr>
+        <p:cNvPr id="1" name=""/>
+        <p:cNvGrpSpPr/>
+        <p:nvPr/>
+      </p:nvGrpSpPr>
+      <p:grpSpPr>
+        <a:xfrm>
+          <a:off x="0" y="0"/>
+          <a:ext cx="0" cy="0"/>
+          <a:chOff x="0" y="0"/>
+          <a:chExt cx="0" cy="0"/>
+        </a:xfrm>
+      </p:grpSpPr>
+      <p:sp>
+        <p:nvSpPr>
+          <p:cNvPr id="2" name="Заголовок 1">
+            <a:extLst>
+              <a:ext uri="{FF2B5EF4-FFF2-40B4-BE49-F238E27FC236}">
+                <a16:creationId xmlns:a16="http://schemas.microsoft.com/office/drawing/2014/main" id="{844953BD-3C0E-CFA8-1C07-22A206477148}"/>
+              </a:ext>
+            </a:extLst>
+          </p:cNvPr>
+          <p:cNvSpPr>
+            <a:spLocks noGrp="1"/>
+          </p:cNvSpPr>
+          <p:nvPr>
+            <p:ph type="title"/>
+          </p:nvPr>
+        </p:nvSpPr>
+        <p:spPr/>
+        <p:txBody>
+          <a:bodyPr/>
+          <a:lstStyle/>
+          <a:p>
+            <a:r>
+              <a:rPr lang="en-US" dirty="0"/>
+              <a:t>OpenCL (Open Computing Language)</a:t>
+            </a:r>
+            <a:endParaRPr lang="ru-RU" dirty="0"/>
+          </a:p>
+        </p:txBody>
+      </p:sp>
+      <p:sp>
+        <p:nvSpPr>
+          <p:cNvPr id="3" name="Объект 2">
+            <a:extLst>
+              <a:ext uri="{FF2B5EF4-FFF2-40B4-BE49-F238E27FC236}">
+                <a16:creationId xmlns:a16="http://schemas.microsoft.com/office/drawing/2014/main" id="{8E5579CC-6609-18EA-40D3-BB43AA47C23A}"/>
+              </a:ext>
+            </a:extLst>
+          </p:cNvPr>
+          <p:cNvSpPr>
+            <a:spLocks noGrp="1"/>
+          </p:cNvSpPr>
+          <p:nvPr>
+            <p:ph idx="1"/>
+          </p:nvPr>
+        </p:nvSpPr>
+        <p:spPr/>
+        <p:txBody>
+          <a:bodyPr/>
+          <a:lstStyle/>
+          <a:p>
+            <a:r>
+              <a:rPr lang="ru-RU" dirty="0" err="1"/>
+              <a:t>OpenCL</a:t>
+            </a:r>
+            <a:r>
+              <a:rPr lang="ru-RU" dirty="0"/>
+              <a:t> — это открытый стандарт для параллельных вычислений на </a:t>
+            </a:r>
+            <a:r>
+              <a:rPr lang="ru-RU" dirty="0" err="1"/>
+              <a:t>расличных</a:t>
+            </a:r>
+            <a:r>
+              <a:rPr lang="ru-RU" dirty="0"/>
+              <a:t> системах (CPU, GPU и других устройствах). Он разработан </a:t>
+            </a:r>
+            <a:r>
+              <a:rPr lang="ru-RU" dirty="0" err="1"/>
+              <a:t>Khronos</a:t>
+            </a:r>
+            <a:r>
+              <a:rPr lang="ru-RU" dirty="0"/>
+              <a:t> Group и поддерживается на устройствах от разных производителей (NVIDIA, AMD, Intel, ARM и др.).</a:t>
+            </a:r>
+          </a:p>
+          <a:p>
+            <a:r>
+              <a:rPr lang="ru-RU" dirty="0"/>
+              <a:t>Основные концепции </a:t>
+            </a:r>
+            <a:r>
+              <a:rPr lang="ru-RU" dirty="0" err="1"/>
+              <a:t>OpenCL</a:t>
+            </a:r>
+            <a:r>
+              <a:rPr lang="ru-RU" dirty="0"/>
+              <a:t> включают платформу, устройство, контекст, очередь команд и ядро. </a:t>
+            </a:r>
+          </a:p>
+        </p:txBody>
+      </p:sp>
+    </p:spTree>
+    <p:extLst>
+      <p:ext uri="{BB962C8B-B14F-4D97-AF65-F5344CB8AC3E}">
+        <p14:creationId xmlns:p14="http://schemas.microsoft.com/office/powerpoint/2010/main" val="4134806854"/>
+      </p:ext>
+    </p:extLst>
+  </p:cSld>
+  <p:clrMapOvr>
+    <a:masterClrMapping/>
+  </p:clrMapOvr>
+</p:sld>
+</file>
+
+<file path=ppt/slides/slide11.xml><?xml version="1.0" encoding="utf-8"?>
+<p:sld xmlns:a="http://schemas.openxmlformats.org/drawingml/2006/main" xmlns:r="http://schemas.openxmlformats.org/officeDocument/2006/relationships" xmlns:p="http://schemas.openxmlformats.org/presentationml/2006/main">
+  <p:cSld>
+    <p:spTree>
+      <p:nvGrpSpPr>
+        <p:cNvPr id="1" name=""/>
+        <p:cNvGrpSpPr/>
+        <p:nvPr/>
+      </p:nvGrpSpPr>
+      <p:grpSpPr>
+        <a:xfrm>
+          <a:off x="0" y="0"/>
+          <a:ext cx="0" cy="0"/>
+          <a:chOff x="0" y="0"/>
+          <a:chExt cx="0" cy="0"/>
+        </a:xfrm>
+      </p:grpSpPr>
+      <p:sp>
+        <p:nvSpPr>
+          <p:cNvPr id="2" name="Заголовок 1">
+            <a:extLst>
+              <a:ext uri="{FF2B5EF4-FFF2-40B4-BE49-F238E27FC236}">
+                <a16:creationId xmlns:a16="http://schemas.microsoft.com/office/drawing/2014/main" id="{7583C50C-7439-FCBA-1E3E-ED40A785E718}"/>
+              </a:ext>
+            </a:extLst>
+          </p:cNvPr>
+          <p:cNvSpPr>
+            <a:spLocks noGrp="1"/>
+          </p:cNvSpPr>
+          <p:nvPr>
+            <p:ph type="title"/>
+          </p:nvPr>
+        </p:nvSpPr>
+        <p:spPr/>
+        <p:txBody>
+          <a:bodyPr/>
+          <a:lstStyle/>
+          <a:p>
+            <a:r>
+              <a:rPr lang="ru-RU" dirty="0"/>
+              <a:t>Основные концепции </a:t>
+            </a:r>
+            <a:r>
+              <a:rPr lang="ru-RU" dirty="0" err="1"/>
+              <a:t>OpenCL</a:t>
+            </a:r>
+            <a:endParaRPr lang="ru-RU" dirty="0"/>
+          </a:p>
+        </p:txBody>
+      </p:sp>
+      <p:sp>
+        <p:nvSpPr>
+          <p:cNvPr id="8" name="Прямоугольник 7">
+            <a:extLst>
+              <a:ext uri="{FF2B5EF4-FFF2-40B4-BE49-F238E27FC236}">
+                <a16:creationId xmlns:a16="http://schemas.microsoft.com/office/drawing/2014/main" id="{48BAB35B-3CCB-8789-451F-3C0E17730086}"/>
+              </a:ext>
+            </a:extLst>
+          </p:cNvPr>
+          <p:cNvSpPr/>
+          <p:nvPr/>
+        </p:nvSpPr>
+        <p:spPr>
+          <a:xfrm>
+            <a:off x="431321" y="2078972"/>
+            <a:ext cx="1673524" cy="1086928"/>
+          </a:xfrm>
+          <a:prstGeom prst="rect">
+            <a:avLst/>
+          </a:prstGeom>
+        </p:spPr>
+        <p:style>
+          <a:lnRef idx="2">
+            <a:schemeClr val="accent1">
+              <a:shade val="15000"/>
+            </a:schemeClr>
+          </a:lnRef>
+          <a:fillRef idx="1">
+            <a:schemeClr val="accent1"/>
+          </a:fillRef>
+          <a:effectRef idx="0">
+            <a:schemeClr val="accent1"/>
+          </a:effectRef>
+          <a:fontRef idx="minor">
+            <a:schemeClr val="lt1"/>
+          </a:fontRef>
+        </p:style>
+        <p:txBody>
+          <a:bodyPr rtlCol="0" anchor="ctr"/>
+          <a:lstStyle/>
+          <a:p>
+            <a:pPr algn="ctr"/>
+            <a:r>
+              <a:rPr lang="ru-RU" dirty="0"/>
+              <a:t>Платформа</a:t>
+            </a:r>
+          </a:p>
+        </p:txBody>
+      </p:sp>
+      <p:sp>
+        <p:nvSpPr>
+          <p:cNvPr id="9" name="Прямоугольник 8">
+            <a:extLst>
+              <a:ext uri="{FF2B5EF4-FFF2-40B4-BE49-F238E27FC236}">
+                <a16:creationId xmlns:a16="http://schemas.microsoft.com/office/drawing/2014/main" id="{A0436785-6614-7D76-CE7E-FE37AC42B333}"/>
+              </a:ext>
+            </a:extLst>
+          </p:cNvPr>
+          <p:cNvSpPr/>
+          <p:nvPr/>
+        </p:nvSpPr>
+        <p:spPr>
+          <a:xfrm>
+            <a:off x="2817962" y="2078972"/>
+            <a:ext cx="1673524" cy="1086928"/>
+          </a:xfrm>
+          <a:prstGeom prst="rect">
+            <a:avLst/>
+          </a:prstGeom>
+        </p:spPr>
+        <p:style>
+          <a:lnRef idx="2">
+            <a:schemeClr val="accent1">
+              <a:shade val="15000"/>
+            </a:schemeClr>
+          </a:lnRef>
+          <a:fillRef idx="1">
+            <a:schemeClr val="accent1"/>
+          </a:fillRef>
+          <a:effectRef idx="0">
+            <a:schemeClr val="accent1"/>
+          </a:effectRef>
+          <a:fontRef idx="minor">
+            <a:schemeClr val="lt1"/>
+          </a:fontRef>
+        </p:style>
+        <p:txBody>
+          <a:bodyPr rtlCol="0" anchor="ctr"/>
+          <a:lstStyle/>
+          <a:p>
+            <a:pPr algn="ctr"/>
+            <a:r>
+              <a:rPr lang="ru-RU" dirty="0"/>
+              <a:t>Устройство</a:t>
+            </a:r>
+            <a:endParaRPr lang="en-US" dirty="0"/>
+          </a:p>
+        </p:txBody>
+      </p:sp>
+      <p:sp>
+        <p:nvSpPr>
+          <p:cNvPr id="10" name="Прямоугольник 9">
+            <a:extLst>
+              <a:ext uri="{FF2B5EF4-FFF2-40B4-BE49-F238E27FC236}">
+                <a16:creationId xmlns:a16="http://schemas.microsoft.com/office/drawing/2014/main" id="{C9838957-AFEF-CC41-385E-0D1920FB334D}"/>
+              </a:ext>
+            </a:extLst>
+          </p:cNvPr>
+          <p:cNvSpPr/>
+          <p:nvPr/>
+        </p:nvSpPr>
+        <p:spPr>
+          <a:xfrm>
+            <a:off x="5204603" y="2078972"/>
+            <a:ext cx="1673524" cy="1086928"/>
+          </a:xfrm>
+          <a:prstGeom prst="rect">
+            <a:avLst/>
+          </a:prstGeom>
+        </p:spPr>
+        <p:style>
+          <a:lnRef idx="2">
+            <a:schemeClr val="accent1">
+              <a:shade val="15000"/>
+            </a:schemeClr>
+          </a:lnRef>
+          <a:fillRef idx="1">
+            <a:schemeClr val="accent1"/>
+          </a:fillRef>
+          <a:effectRef idx="0">
+            <a:schemeClr val="accent1"/>
+          </a:effectRef>
+          <a:fontRef idx="minor">
+            <a:schemeClr val="lt1"/>
+          </a:fontRef>
+        </p:style>
+        <p:txBody>
+          <a:bodyPr rtlCol="0" anchor="ctr"/>
+          <a:lstStyle/>
+          <a:p>
+            <a:pPr algn="ctr"/>
+            <a:r>
+              <a:rPr lang="ru-RU" dirty="0"/>
+              <a:t>Контекст</a:t>
+            </a:r>
+            <a:endParaRPr lang="en-US" dirty="0"/>
+          </a:p>
+        </p:txBody>
+      </p:sp>
+      <p:sp>
+        <p:nvSpPr>
+          <p:cNvPr id="11" name="Прямоугольник 10">
+            <a:extLst>
+              <a:ext uri="{FF2B5EF4-FFF2-40B4-BE49-F238E27FC236}">
+                <a16:creationId xmlns:a16="http://schemas.microsoft.com/office/drawing/2014/main" id="{76782B1A-9433-3607-1BC2-BD13827C28F7}"/>
+              </a:ext>
+            </a:extLst>
+          </p:cNvPr>
+          <p:cNvSpPr/>
+          <p:nvPr/>
+        </p:nvSpPr>
+        <p:spPr>
+          <a:xfrm>
+            <a:off x="7591244" y="2078972"/>
+            <a:ext cx="1673524" cy="1086928"/>
+          </a:xfrm>
+          <a:prstGeom prst="rect">
+            <a:avLst/>
+          </a:prstGeom>
+        </p:spPr>
+        <p:style>
+          <a:lnRef idx="2">
+            <a:schemeClr val="accent1">
+              <a:shade val="15000"/>
+            </a:schemeClr>
+          </a:lnRef>
+          <a:fillRef idx="1">
+            <a:schemeClr val="accent1"/>
+          </a:fillRef>
+          <a:effectRef idx="0">
+            <a:schemeClr val="accent1"/>
+          </a:effectRef>
+          <a:fontRef idx="minor">
+            <a:schemeClr val="lt1"/>
+          </a:fontRef>
+        </p:style>
+        <p:txBody>
+          <a:bodyPr rtlCol="0" anchor="ctr"/>
+          <a:lstStyle/>
+          <a:p>
+            <a:pPr algn="ctr"/>
+            <a:r>
+              <a:rPr lang="ru-RU" dirty="0"/>
+              <a:t>Очередь</a:t>
+            </a:r>
+          </a:p>
+        </p:txBody>
+      </p:sp>
+      <p:sp>
+        <p:nvSpPr>
+          <p:cNvPr id="12" name="Прямоугольник 11">
+            <a:extLst>
+              <a:ext uri="{FF2B5EF4-FFF2-40B4-BE49-F238E27FC236}">
+                <a16:creationId xmlns:a16="http://schemas.microsoft.com/office/drawing/2014/main" id="{39C155D7-0042-2655-9D76-87BB774527D3}"/>
+              </a:ext>
+            </a:extLst>
+          </p:cNvPr>
+          <p:cNvSpPr/>
+          <p:nvPr/>
+        </p:nvSpPr>
+        <p:spPr>
+          <a:xfrm>
+            <a:off x="9977885" y="2078972"/>
+            <a:ext cx="1673524" cy="1086928"/>
+          </a:xfrm>
+          <a:prstGeom prst="rect">
+            <a:avLst/>
+          </a:prstGeom>
+        </p:spPr>
+        <p:style>
+          <a:lnRef idx="2">
+            <a:schemeClr val="accent1">
+              <a:shade val="15000"/>
+            </a:schemeClr>
+          </a:lnRef>
+          <a:fillRef idx="1">
+            <a:schemeClr val="accent1"/>
+          </a:fillRef>
+          <a:effectRef idx="0">
+            <a:schemeClr val="accent1"/>
+          </a:effectRef>
+          <a:fontRef idx="minor">
+            <a:schemeClr val="lt1"/>
+          </a:fontRef>
+        </p:style>
+        <p:txBody>
+          <a:bodyPr rtlCol="0" anchor="ctr"/>
+          <a:lstStyle/>
+          <a:p>
+            <a:pPr algn="ctr"/>
+            <a:r>
+              <a:rPr lang="ru-RU" dirty="0"/>
+              <a:t>Ядро</a:t>
+            </a:r>
+          </a:p>
+        </p:txBody>
+      </p:sp>
+      <p:cxnSp>
+        <p:nvCxnSpPr>
+          <p:cNvPr id="14" name="Прямая со стрелкой 13">
+            <a:extLst>
+              <a:ext uri="{FF2B5EF4-FFF2-40B4-BE49-F238E27FC236}">
+                <a16:creationId xmlns:a16="http://schemas.microsoft.com/office/drawing/2014/main" id="{13766E79-915A-C955-7750-CBDBAB16F90C}"/>
+              </a:ext>
+            </a:extLst>
+          </p:cNvPr>
+          <p:cNvCxnSpPr>
+            <a:cxnSpLocks/>
+            <a:stCxn id="8" idx="3"/>
+            <a:endCxn id="9" idx="1"/>
+          </p:cNvCxnSpPr>
+          <p:nvPr/>
+        </p:nvCxnSpPr>
+        <p:spPr>
+          <a:xfrm>
+            <a:off x="2104845" y="2622436"/>
+            <a:ext cx="713117" cy="0"/>
+          </a:xfrm>
+          <a:prstGeom prst="straightConnector1">
+            <a:avLst/>
+          </a:prstGeom>
+          <a:ln>
+            <a:tailEnd type="triangle"/>
+          </a:ln>
+        </p:spPr>
+        <p:style>
+          <a:lnRef idx="1">
+            <a:schemeClr val="accent1"/>
+          </a:lnRef>
+          <a:fillRef idx="0">
+            <a:schemeClr val="accent1"/>
+          </a:fillRef>
+          <a:effectRef idx="0">
+            <a:schemeClr val="accent1"/>
+          </a:effectRef>
+          <a:fontRef idx="minor">
+            <a:schemeClr val="tx1"/>
+          </a:fontRef>
+        </p:style>
+      </p:cxnSp>
+      <p:cxnSp>
+        <p:nvCxnSpPr>
+          <p:cNvPr id="17" name="Прямая со стрелкой 16">
+            <a:extLst>
+              <a:ext uri="{FF2B5EF4-FFF2-40B4-BE49-F238E27FC236}">
+                <a16:creationId xmlns:a16="http://schemas.microsoft.com/office/drawing/2014/main" id="{4C7B4693-456C-1EEE-AF2C-8FA199763720}"/>
+              </a:ext>
+            </a:extLst>
+          </p:cNvPr>
+          <p:cNvCxnSpPr>
+            <a:cxnSpLocks/>
+            <a:stCxn id="9" idx="3"/>
+            <a:endCxn id="10" idx="1"/>
+          </p:cNvCxnSpPr>
+          <p:nvPr/>
+        </p:nvCxnSpPr>
+        <p:spPr>
+          <a:xfrm>
+            <a:off x="4491486" y="2622436"/>
+            <a:ext cx="713117" cy="0"/>
+          </a:xfrm>
+          <a:prstGeom prst="straightConnector1">
+            <a:avLst/>
+          </a:prstGeom>
+          <a:ln>
+            <a:tailEnd type="triangle"/>
+          </a:ln>
+        </p:spPr>
+        <p:style>
+          <a:lnRef idx="1">
+            <a:schemeClr val="accent1"/>
+          </a:lnRef>
+          <a:fillRef idx="0">
+            <a:schemeClr val="accent1"/>
+          </a:fillRef>
+          <a:effectRef idx="0">
+            <a:schemeClr val="accent1"/>
+          </a:effectRef>
+          <a:fontRef idx="minor">
+            <a:schemeClr val="tx1"/>
+          </a:fontRef>
+        </p:style>
+      </p:cxnSp>
+      <p:cxnSp>
+        <p:nvCxnSpPr>
+          <p:cNvPr id="20" name="Прямая со стрелкой 19">
+            <a:extLst>
+              <a:ext uri="{FF2B5EF4-FFF2-40B4-BE49-F238E27FC236}">
+                <a16:creationId xmlns:a16="http://schemas.microsoft.com/office/drawing/2014/main" id="{BB486E70-46AA-0610-2BA9-199FC2CE7270}"/>
+              </a:ext>
+            </a:extLst>
+          </p:cNvPr>
+          <p:cNvCxnSpPr>
+            <a:stCxn id="10" idx="3"/>
+            <a:endCxn id="10" idx="3"/>
+          </p:cNvCxnSpPr>
+          <p:nvPr/>
+        </p:nvCxnSpPr>
+        <p:spPr>
+          <a:xfrm>
+            <a:off x="6878127" y="2622436"/>
+            <a:ext cx="0" cy="0"/>
+          </a:xfrm>
+          <a:prstGeom prst="straightConnector1">
+            <a:avLst/>
+          </a:prstGeom>
+          <a:ln>
+            <a:tailEnd type="triangle"/>
+          </a:ln>
+        </p:spPr>
+        <p:style>
+          <a:lnRef idx="1">
+            <a:schemeClr val="accent1"/>
+          </a:lnRef>
+          <a:fillRef idx="0">
+            <a:schemeClr val="accent1"/>
+          </a:fillRef>
+          <a:effectRef idx="0">
+            <a:schemeClr val="accent1"/>
+          </a:effectRef>
+          <a:fontRef idx="minor">
+            <a:schemeClr val="tx1"/>
+          </a:fontRef>
+        </p:style>
+      </p:cxnSp>
+      <p:cxnSp>
+        <p:nvCxnSpPr>
+          <p:cNvPr id="22" name="Прямая со стрелкой 21">
+            <a:extLst>
+              <a:ext uri="{FF2B5EF4-FFF2-40B4-BE49-F238E27FC236}">
+                <a16:creationId xmlns:a16="http://schemas.microsoft.com/office/drawing/2014/main" id="{9841F43A-5382-C17A-FF8D-289B376B3FA6}"/>
+              </a:ext>
+            </a:extLst>
+          </p:cNvPr>
+          <p:cNvCxnSpPr>
+            <a:cxnSpLocks/>
+            <a:stCxn id="10" idx="3"/>
+            <a:endCxn id="11" idx="1"/>
+          </p:cNvCxnSpPr>
+          <p:nvPr/>
+        </p:nvCxnSpPr>
+        <p:spPr>
+          <a:xfrm>
+            <a:off x="6878127" y="2622436"/>
+            <a:ext cx="713117" cy="0"/>
+          </a:xfrm>
+          <a:prstGeom prst="straightConnector1">
+            <a:avLst/>
+          </a:prstGeom>
+          <a:ln>
+            <a:tailEnd type="triangle"/>
+          </a:ln>
+        </p:spPr>
+        <p:style>
+          <a:lnRef idx="1">
+            <a:schemeClr val="accent1"/>
+          </a:lnRef>
+          <a:fillRef idx="0">
+            <a:schemeClr val="accent1"/>
+          </a:fillRef>
+          <a:effectRef idx="0">
+            <a:schemeClr val="accent1"/>
+          </a:effectRef>
+          <a:fontRef idx="minor">
+            <a:schemeClr val="tx1"/>
+          </a:fontRef>
+        </p:style>
+      </p:cxnSp>
+      <p:cxnSp>
+        <p:nvCxnSpPr>
+          <p:cNvPr id="25" name="Прямая со стрелкой 24">
+            <a:extLst>
+              <a:ext uri="{FF2B5EF4-FFF2-40B4-BE49-F238E27FC236}">
+                <a16:creationId xmlns:a16="http://schemas.microsoft.com/office/drawing/2014/main" id="{975ED69E-C552-5FAE-4679-FCE54147050F}"/>
+              </a:ext>
+            </a:extLst>
+          </p:cNvPr>
+          <p:cNvCxnSpPr>
+            <a:cxnSpLocks/>
+            <a:stCxn id="11" idx="3"/>
+            <a:endCxn id="12" idx="1"/>
+          </p:cNvCxnSpPr>
+          <p:nvPr/>
+        </p:nvCxnSpPr>
+        <p:spPr>
+          <a:xfrm>
+            <a:off x="9264768" y="2622436"/>
+            <a:ext cx="713117" cy="0"/>
+          </a:xfrm>
+          <a:prstGeom prst="straightConnector1">
+            <a:avLst/>
+          </a:prstGeom>
+          <a:ln>
+            <a:tailEnd type="triangle"/>
+          </a:ln>
+        </p:spPr>
+        <p:style>
+          <a:lnRef idx="1">
+            <a:schemeClr val="accent1"/>
+          </a:lnRef>
+          <a:fillRef idx="0">
+            <a:schemeClr val="accent1"/>
+          </a:fillRef>
+          <a:effectRef idx="0">
+            <a:schemeClr val="accent1"/>
+          </a:effectRef>
+          <a:fontRef idx="minor">
+            <a:schemeClr val="tx1"/>
+          </a:fontRef>
+        </p:style>
+      </p:cxnSp>
+      <p:sp>
+        <p:nvSpPr>
+          <p:cNvPr id="31" name="TextBox 30">
+            <a:extLst>
+              <a:ext uri="{FF2B5EF4-FFF2-40B4-BE49-F238E27FC236}">
+                <a16:creationId xmlns:a16="http://schemas.microsoft.com/office/drawing/2014/main" id="{5C1DD625-6380-0F48-7437-EDC2B1E18459}"/>
+              </a:ext>
+            </a:extLst>
+          </p:cNvPr>
+          <p:cNvSpPr txBox="1"/>
+          <p:nvPr/>
+        </p:nvSpPr>
+        <p:spPr>
+          <a:xfrm>
+            <a:off x="267420" y="3247653"/>
+            <a:ext cx="1975448" cy="1477328"/>
+          </a:xfrm>
+          <a:prstGeom prst="rect">
+            <a:avLst/>
+          </a:prstGeom>
+          <a:noFill/>
+        </p:spPr>
+        <p:txBody>
+          <a:bodyPr wrap="square" rtlCol="0">
+            <a:spAutoFit/>
+          </a:bodyPr>
+          <a:lstStyle/>
+          <a:p>
+            <a:r>
+              <a:rPr lang="ru-RU" b="1" dirty="0"/>
+              <a:t>Абстракция для устройства </a:t>
+            </a:r>
+            <a:r>
+              <a:rPr lang="ru-RU" dirty="0"/>
+              <a:t>или группы устройств (например, GPU NVIDIA или AMD)</a:t>
+            </a:r>
+          </a:p>
+        </p:txBody>
+      </p:sp>
+      <p:sp>
+        <p:nvSpPr>
+          <p:cNvPr id="32" name="TextBox 31">
+            <a:extLst>
+              <a:ext uri="{FF2B5EF4-FFF2-40B4-BE49-F238E27FC236}">
+                <a16:creationId xmlns:a16="http://schemas.microsoft.com/office/drawing/2014/main" id="{C6686295-009F-87B6-6ACE-E6AA80B6E7C9}"/>
+              </a:ext>
+            </a:extLst>
+          </p:cNvPr>
+          <p:cNvSpPr txBox="1"/>
+          <p:nvPr/>
+        </p:nvSpPr>
+        <p:spPr>
+          <a:xfrm>
+            <a:off x="2606613" y="3247653"/>
+            <a:ext cx="1998455" cy="2031325"/>
+          </a:xfrm>
+          <a:prstGeom prst="rect">
+            <a:avLst/>
+          </a:prstGeom>
+          <a:noFill/>
+        </p:spPr>
+        <p:txBody>
+          <a:bodyPr wrap="square" rtlCol="0">
+            <a:spAutoFit/>
+          </a:bodyPr>
+          <a:lstStyle/>
+          <a:p>
+            <a:r>
+              <a:rPr lang="ru-RU" b="1" dirty="0"/>
+              <a:t>Конкретное устройство</a:t>
+            </a:r>
+            <a:r>
+              <a:rPr lang="ru-RU" dirty="0"/>
+              <a:t>, на котором выполняются вычисления (например, видеокарта)</a:t>
+            </a:r>
+          </a:p>
+        </p:txBody>
+      </p:sp>
+      <p:sp>
+        <p:nvSpPr>
+          <p:cNvPr id="33" name="TextBox 32">
+            <a:extLst>
+              <a:ext uri="{FF2B5EF4-FFF2-40B4-BE49-F238E27FC236}">
+                <a16:creationId xmlns:a16="http://schemas.microsoft.com/office/drawing/2014/main" id="{BA79E572-3D41-CB85-8B73-B71BFCED3CBA}"/>
+              </a:ext>
+            </a:extLst>
+          </p:cNvPr>
+          <p:cNvSpPr txBox="1"/>
+          <p:nvPr/>
+        </p:nvSpPr>
+        <p:spPr>
+          <a:xfrm>
+            <a:off x="4968814" y="3247653"/>
+            <a:ext cx="2096220" cy="2031325"/>
+          </a:xfrm>
+          <a:prstGeom prst="rect">
+            <a:avLst/>
+          </a:prstGeom>
+          <a:noFill/>
+        </p:spPr>
+        <p:txBody>
+          <a:bodyPr wrap="square" rtlCol="0">
+            <a:spAutoFit/>
+          </a:bodyPr>
+          <a:lstStyle/>
+          <a:p>
+            <a:r>
+              <a:rPr lang="ru-RU" b="1" dirty="0"/>
+              <a:t>Окружение</a:t>
+            </a:r>
+            <a:r>
+              <a:rPr lang="ru-RU" dirty="0"/>
+              <a:t>, в котором выполняются команды (включает устройства, память и очереди команд)</a:t>
+            </a:r>
+          </a:p>
+        </p:txBody>
+      </p:sp>
+      <p:sp>
+        <p:nvSpPr>
+          <p:cNvPr id="34" name="TextBox 33">
+            <a:extLst>
+              <a:ext uri="{FF2B5EF4-FFF2-40B4-BE49-F238E27FC236}">
+                <a16:creationId xmlns:a16="http://schemas.microsoft.com/office/drawing/2014/main" id="{A7FA7A36-3000-CBFC-E30F-4BC3EB23107E}"/>
+              </a:ext>
+            </a:extLst>
+          </p:cNvPr>
+          <p:cNvSpPr txBox="1"/>
+          <p:nvPr/>
+        </p:nvSpPr>
+        <p:spPr>
+          <a:xfrm>
+            <a:off x="7428778" y="3247653"/>
+            <a:ext cx="1998455" cy="1200329"/>
+          </a:xfrm>
+          <a:prstGeom prst="rect">
+            <a:avLst/>
+          </a:prstGeom>
+          <a:noFill/>
+        </p:spPr>
+        <p:txBody>
+          <a:bodyPr wrap="square" rtlCol="0">
+            <a:spAutoFit/>
+          </a:bodyPr>
+          <a:lstStyle/>
+          <a:p>
+            <a:r>
+              <a:rPr lang="ru-RU" b="1" dirty="0"/>
+              <a:t>Очередь задач</a:t>
+            </a:r>
+            <a:r>
+              <a:rPr lang="ru-RU" dirty="0"/>
+              <a:t>, которые выполняются на устройстве</a:t>
+            </a:r>
+          </a:p>
+        </p:txBody>
+      </p:sp>
+      <p:sp>
+        <p:nvSpPr>
+          <p:cNvPr id="35" name="TextBox 34">
+            <a:extLst>
+              <a:ext uri="{FF2B5EF4-FFF2-40B4-BE49-F238E27FC236}">
+                <a16:creationId xmlns:a16="http://schemas.microsoft.com/office/drawing/2014/main" id="{851B7724-7B3A-AB0E-F705-AC9C0B19A3AF}"/>
+              </a:ext>
+            </a:extLst>
+          </p:cNvPr>
+          <p:cNvSpPr txBox="1"/>
+          <p:nvPr/>
+        </p:nvSpPr>
+        <p:spPr>
+          <a:xfrm>
+            <a:off x="9678839" y="3247653"/>
+            <a:ext cx="2297502" cy="1200329"/>
+          </a:xfrm>
+          <a:prstGeom prst="rect">
+            <a:avLst/>
+          </a:prstGeom>
+          <a:noFill/>
+        </p:spPr>
+        <p:txBody>
+          <a:bodyPr wrap="square" rtlCol="0">
+            <a:spAutoFit/>
+          </a:bodyPr>
+          <a:lstStyle/>
+          <a:p>
+            <a:r>
+              <a:rPr lang="ru-RU" b="1" dirty="0"/>
+              <a:t>Функция</a:t>
+            </a:r>
+            <a:r>
+              <a:rPr lang="ru-RU" dirty="0"/>
+              <a:t>, которая выполняется на GPU. Пишется на языке, похожем на C</a:t>
+            </a:r>
+          </a:p>
+        </p:txBody>
+      </p:sp>
+    </p:spTree>
+    <p:extLst>
+      <p:ext uri="{BB962C8B-B14F-4D97-AF65-F5344CB8AC3E}">
+        <p14:creationId xmlns:p14="http://schemas.microsoft.com/office/powerpoint/2010/main" val="3619905435"/>
+      </p:ext>
+    </p:extLst>
+  </p:cSld>
+  <p:clrMapOvr>
+    <a:masterClrMapping/>
+  </p:clrMapOvr>
+</p:sld>
+</file>
+
+<file path=ppt/slides/slide12.xml><?xml version="1.0" encoding="utf-8"?>
+<p:sld xmlns:a="http://schemas.openxmlformats.org/drawingml/2006/main" xmlns:r="http://schemas.openxmlformats.org/officeDocument/2006/relationships" xmlns:p="http://schemas.openxmlformats.org/presentationml/2006/main">
+  <p:cSld>
+    <p:spTree>
+      <p:nvGrpSpPr>
+        <p:cNvPr id="1" name=""/>
+        <p:cNvGrpSpPr/>
+        <p:nvPr/>
+      </p:nvGrpSpPr>
+      <p:grpSpPr>
+        <a:xfrm>
+          <a:off x="0" y="0"/>
+          <a:ext cx="0" cy="0"/>
+          <a:chOff x="0" y="0"/>
+          <a:chExt cx="0" cy="0"/>
+        </a:xfrm>
+      </p:grpSpPr>
+      <p:sp>
+        <p:nvSpPr>
+          <p:cNvPr id="2" name="Заголовок 1">
+            <a:extLst>
+              <a:ext uri="{FF2B5EF4-FFF2-40B4-BE49-F238E27FC236}">
+                <a16:creationId xmlns:a16="http://schemas.microsoft.com/office/drawing/2014/main" id="{AB5023E0-0A20-0E85-2C69-776BDB5D5AA5}"/>
+              </a:ext>
+            </a:extLst>
+          </p:cNvPr>
+          <p:cNvSpPr>
+            <a:spLocks noGrp="1"/>
+          </p:cNvSpPr>
+          <p:nvPr>
+            <p:ph type="title"/>
+          </p:nvPr>
+        </p:nvSpPr>
+        <p:spPr/>
+        <p:txBody>
+          <a:bodyPr/>
+          <a:lstStyle/>
+          <a:p>
+            <a:r>
+              <a:rPr lang="en-US" dirty="0"/>
+              <a:t>CUDA</a:t>
+            </a:r>
+            <a:endParaRPr lang="ru-RU" dirty="0"/>
+          </a:p>
+        </p:txBody>
+      </p:sp>
+      <p:sp>
+        <p:nvSpPr>
+          <p:cNvPr id="3" name="Объект 2">
+            <a:extLst>
+              <a:ext uri="{FF2B5EF4-FFF2-40B4-BE49-F238E27FC236}">
+                <a16:creationId xmlns:a16="http://schemas.microsoft.com/office/drawing/2014/main" id="{8218DB2A-9E82-1F05-EC68-6F2DBD06EC4E}"/>
+              </a:ext>
+            </a:extLst>
+          </p:cNvPr>
+          <p:cNvSpPr>
+            <a:spLocks noGrp="1"/>
+          </p:cNvSpPr>
+          <p:nvPr>
+            <p:ph idx="1"/>
+          </p:nvPr>
+        </p:nvSpPr>
+        <p:spPr/>
+        <p:txBody>
+          <a:bodyPr/>
+          <a:lstStyle/>
+          <a:p>
+            <a:r>
+              <a:rPr lang="ru-RU" dirty="0"/>
+              <a:t>CUDA — это проприетарная технология NVIDIA для параллельных вычислений на GPU</a:t>
+            </a:r>
+            <a:endParaRPr lang="en-US" dirty="0"/>
+          </a:p>
+          <a:p>
+            <a:r>
+              <a:rPr lang="ru-RU" dirty="0"/>
+              <a:t>Разработана исключительно для GPU NVIDIA, поэтому оптимизирована для </a:t>
+            </a:r>
+            <a:r>
+              <a:rPr lang="en-US" dirty="0"/>
+              <a:t>GPU NVIDIA</a:t>
+            </a:r>
+            <a:endParaRPr lang="ru-RU" dirty="0"/>
+          </a:p>
+        </p:txBody>
+      </p:sp>
+    </p:spTree>
+    <p:extLst>
+      <p:ext uri="{BB962C8B-B14F-4D97-AF65-F5344CB8AC3E}">
+        <p14:creationId xmlns:p14="http://schemas.microsoft.com/office/powerpoint/2010/main" val="169707142"/>
+      </p:ext>
+    </p:extLst>
+  </p:cSld>
+  <p:clrMapOvr>
+    <a:masterClrMapping/>
+  </p:clrMapOvr>
+</p:sld>
+</file>
+
+<file path=ppt/slides/slide13.xml><?xml version="1.0" encoding="utf-8"?>
+<p:sld xmlns:a="http://schemas.openxmlformats.org/drawingml/2006/main" xmlns:r="http://schemas.openxmlformats.org/officeDocument/2006/relationships" xmlns:p="http://schemas.openxmlformats.org/presentationml/2006/main">
+  <p:cSld>
+    <p:spTree>
+      <p:nvGrpSpPr>
+        <p:cNvPr id="1" name=""/>
+        <p:cNvGrpSpPr/>
+        <p:nvPr/>
+      </p:nvGrpSpPr>
+      <p:grpSpPr>
+        <a:xfrm>
+          <a:off x="0" y="0"/>
+          <a:ext cx="0" cy="0"/>
+          <a:chOff x="0" y="0"/>
+          <a:chExt cx="0" cy="0"/>
+        </a:xfrm>
+      </p:grpSpPr>
+      <p:sp>
+        <p:nvSpPr>
+          <p:cNvPr id="2" name="Заголовок 1">
+            <a:extLst>
+              <a:ext uri="{FF2B5EF4-FFF2-40B4-BE49-F238E27FC236}">
+                <a16:creationId xmlns:a16="http://schemas.microsoft.com/office/drawing/2014/main" id="{DE2F175B-4550-328C-D76C-F2FE5F22780B}"/>
+              </a:ext>
+            </a:extLst>
+          </p:cNvPr>
+          <p:cNvSpPr>
+            <a:spLocks noGrp="1"/>
+          </p:cNvSpPr>
+          <p:nvPr>
+            <p:ph type="title"/>
+          </p:nvPr>
+        </p:nvSpPr>
+        <p:spPr/>
+        <p:txBody>
+          <a:bodyPr/>
+          <a:lstStyle/>
+          <a:p>
+            <a:r>
+              <a:rPr lang="ru-RU" dirty="0"/>
+              <a:t>Основные концепции </a:t>
+            </a:r>
+            <a:r>
+              <a:rPr lang="en-US" dirty="0"/>
+              <a:t>CUDA</a:t>
+            </a:r>
+            <a:endParaRPr lang="ru-RU" dirty="0"/>
+          </a:p>
+        </p:txBody>
+      </p:sp>
+      <p:sp>
+        <p:nvSpPr>
+          <p:cNvPr id="3" name="Объект 2">
+            <a:extLst>
+              <a:ext uri="{FF2B5EF4-FFF2-40B4-BE49-F238E27FC236}">
+                <a16:creationId xmlns:a16="http://schemas.microsoft.com/office/drawing/2014/main" id="{CD3432F4-4BF6-DE66-1A71-DE91D621ACA9}"/>
+              </a:ext>
+            </a:extLst>
+          </p:cNvPr>
+          <p:cNvSpPr>
+            <a:spLocks noGrp="1"/>
+          </p:cNvSpPr>
+          <p:nvPr>
+            <p:ph idx="1"/>
+          </p:nvPr>
+        </p:nvSpPr>
+        <p:spPr/>
+        <p:txBody>
+          <a:bodyPr>
+            <a:normAutofit/>
+          </a:bodyPr>
+          <a:lstStyle/>
+          <a:p>
+            <a:r>
+              <a:rPr lang="ru-RU" dirty="0"/>
+              <a:t>Потоки (</a:t>
+            </a:r>
+            <a:r>
+              <a:rPr lang="ru-RU" dirty="0" err="1"/>
+              <a:t>Threads</a:t>
+            </a:r>
+            <a:r>
+              <a:rPr lang="ru-RU" dirty="0"/>
+              <a:t>): Базовая единица выполнения. Потоки объединяются в блоки.</a:t>
+            </a:r>
+          </a:p>
+          <a:p>
+            <a:r>
+              <a:rPr lang="ru-RU" dirty="0"/>
+              <a:t>Блоки (</a:t>
+            </a:r>
+            <a:r>
+              <a:rPr lang="ru-RU" dirty="0" err="1"/>
+              <a:t>Blocks</a:t>
+            </a:r>
+            <a:r>
+              <a:rPr lang="ru-RU" dirty="0"/>
+              <a:t>): Группа потоков, которые могут взаимодействовать через </a:t>
+            </a:r>
+            <a:r>
+              <a:rPr lang="ru-RU" dirty="0" err="1"/>
+              <a:t>shared</a:t>
+            </a:r>
+            <a:r>
+              <a:rPr lang="ru-RU" dirty="0"/>
+              <a:t> </a:t>
+            </a:r>
+            <a:r>
+              <a:rPr lang="ru-RU" dirty="0" err="1"/>
+              <a:t>memory</a:t>
+            </a:r>
+            <a:r>
+              <a:rPr lang="ru-RU" dirty="0"/>
+              <a:t>.</a:t>
+            </a:r>
+          </a:p>
+          <a:p>
+            <a:r>
+              <a:rPr lang="ru-RU" dirty="0"/>
+              <a:t>Сетки (</a:t>
+            </a:r>
+            <a:r>
+              <a:rPr lang="ru-RU" dirty="0" err="1"/>
+              <a:t>Grids</a:t>
+            </a:r>
+            <a:r>
+              <a:rPr lang="ru-RU" dirty="0"/>
+              <a:t>): Группа блоков, выполняющих одно ядро.</a:t>
+            </a:r>
+          </a:p>
+        </p:txBody>
+      </p:sp>
+    </p:spTree>
+    <p:extLst>
+      <p:ext uri="{BB962C8B-B14F-4D97-AF65-F5344CB8AC3E}">
+        <p14:creationId xmlns:p14="http://schemas.microsoft.com/office/powerpoint/2010/main" val="2463894455"/>
+      </p:ext>
+    </p:extLst>
+  </p:cSld>
+  <p:clrMapOvr>
+    <a:masterClrMapping/>
+  </p:clrMapOvr>
+</p:sld>
+</file>
+
+<file path=ppt/slides/slide14.xml><?xml version="1.0" encoding="utf-8"?>
+<p:sld xmlns:a="http://schemas.openxmlformats.org/drawingml/2006/main" xmlns:r="http://schemas.openxmlformats.org/officeDocument/2006/relationships" xmlns:p="http://schemas.openxmlformats.org/presentationml/2006/main">
+  <p:cSld>
+    <p:spTree>
+      <p:nvGrpSpPr>
+        <p:cNvPr id="1" name=""/>
+        <p:cNvGrpSpPr/>
+        <p:nvPr/>
+      </p:nvGrpSpPr>
+      <p:grpSpPr>
+        <a:xfrm>
+          <a:off x="0" y="0"/>
+          <a:ext cx="0" cy="0"/>
+          <a:chOff x="0" y="0"/>
+          <a:chExt cx="0" cy="0"/>
+        </a:xfrm>
+      </p:grpSpPr>
+      <p:sp>
+        <p:nvSpPr>
+          <p:cNvPr id="2" name="Заголовок 1">
+            <a:extLst>
+              <a:ext uri="{FF2B5EF4-FFF2-40B4-BE49-F238E27FC236}">
+                <a16:creationId xmlns:a16="http://schemas.microsoft.com/office/drawing/2014/main" id="{949A3359-9C3E-5D3C-D010-0C88964D8955}"/>
+              </a:ext>
+            </a:extLst>
+          </p:cNvPr>
+          <p:cNvSpPr>
+            <a:spLocks noGrp="1"/>
+          </p:cNvSpPr>
+          <p:nvPr>
+            <p:ph type="title"/>
+          </p:nvPr>
+        </p:nvSpPr>
+        <p:spPr/>
+        <p:txBody>
+          <a:bodyPr/>
+          <a:lstStyle/>
+          <a:p>
+            <a:r>
+              <a:rPr lang="ru-RU" dirty="0"/>
+              <a:t>Основные концепции </a:t>
+            </a:r>
+            <a:r>
+              <a:rPr lang="en-US" dirty="0"/>
+              <a:t>CUDA</a:t>
+            </a:r>
+            <a:endParaRPr lang="ru-RU" dirty="0"/>
+          </a:p>
+        </p:txBody>
+      </p:sp>
+      <p:pic>
+        <p:nvPicPr>
+          <p:cNvPr id="1028" name="Picture 4">
+            <a:extLst>
+              <a:ext uri="{FF2B5EF4-FFF2-40B4-BE49-F238E27FC236}">
+                <a16:creationId xmlns:a16="http://schemas.microsoft.com/office/drawing/2014/main" id="{41583263-2A2E-C694-CF23-6314B75EB045}"/>
+              </a:ext>
+            </a:extLst>
+          </p:cNvPr>
+          <p:cNvPicPr>
+            <a:picLocks noGrp="1" noChangeAspect="1" noChangeArrowheads="1"/>
+          </p:cNvPicPr>
+          <p:nvPr>
+            <p:ph idx="1"/>
+          </p:nvPr>
+        </p:nvPicPr>
+        <p:blipFill>
+          <a:blip r:embed="rId2">
+            <a:extLst>
+              <a:ext uri="{28A0092B-C50C-407E-A947-70E740481C1C}">
+                <a14:useLocalDpi xmlns:a14="http://schemas.microsoft.com/office/drawing/2010/main" val="0"/>
+              </a:ext>
+            </a:extLst>
+          </a:blip>
+          <a:srcRect/>
+          <a:stretch>
+            <a:fillRect/>
+          </a:stretch>
+        </p:blipFill>
+        <p:spPr bwMode="auto">
+          <a:xfrm>
+            <a:off x="5638800" y="2069516"/>
+            <a:ext cx="5715000" cy="3829050"/>
+          </a:xfrm>
+          <a:prstGeom prst="rect">
+            <a:avLst/>
+          </a:prstGeom>
+          <a:noFill/>
+          <a:extLst>
+            <a:ext uri="{909E8E84-426E-40DD-AFC4-6F175D3DCCD1}">
+              <a14:hiddenFill xmlns:a14="http://schemas.microsoft.com/office/drawing/2010/main">
+                <a:solidFill>
+                  <a:srgbClr val="FFFFFF"/>
+                </a:solidFill>
+              </a14:hiddenFill>
+            </a:ext>
+          </a:extLst>
+        </p:spPr>
+      </p:pic>
+      <p:sp>
+        <p:nvSpPr>
+          <p:cNvPr id="8" name="TextBox 7">
+            <a:extLst>
+              <a:ext uri="{FF2B5EF4-FFF2-40B4-BE49-F238E27FC236}">
+                <a16:creationId xmlns:a16="http://schemas.microsoft.com/office/drawing/2014/main" id="{EAE295D0-F22E-5FF6-1011-2E1CA5B7AB52}"/>
+              </a:ext>
+            </a:extLst>
+          </p:cNvPr>
+          <p:cNvSpPr txBox="1"/>
+          <p:nvPr/>
+        </p:nvSpPr>
+        <p:spPr>
+          <a:xfrm>
+            <a:off x="519741" y="2156900"/>
+            <a:ext cx="4863142" cy="1405513"/>
+          </a:xfrm>
+          <a:prstGeom prst="rect">
+            <a:avLst/>
+          </a:prstGeom>
+          <a:noFill/>
+        </p:spPr>
+        <p:txBody>
+          <a:bodyPr wrap="square">
+            <a:spAutoFit/>
+          </a:bodyPr>
+          <a:lstStyle/>
+          <a:p>
+            <a:pPr rtl="0" fontAlgn="base">
+              <a:buFont typeface="Arial" panose="020B0604020202020204" pitchFamily="34" charset="0"/>
+              <a:buChar char="•"/>
+            </a:pPr>
+            <a:r>
+              <a:rPr lang="ru-RU" sz="1800" b="0" i="0" u="none" strike="noStrike" dirty="0">
+                <a:solidFill>
+                  <a:srgbClr val="595959"/>
+                </a:solidFill>
+                <a:effectLst/>
+                <a:latin typeface="Arial" panose="020B0604020202020204" pitchFamily="34" charset="0"/>
+              </a:rPr>
+              <a:t>Растение – поток (</a:t>
+            </a:r>
+            <a:r>
+              <a:rPr lang="ru-RU" sz="1800" b="0" i="0" u="none" strike="noStrike" dirty="0" err="1">
+                <a:solidFill>
+                  <a:srgbClr val="595959"/>
+                </a:solidFill>
+                <a:effectLst/>
+                <a:latin typeface="Arial" panose="020B0604020202020204" pitchFamily="34" charset="0"/>
+              </a:rPr>
+              <a:t>thread</a:t>
+            </a:r>
+            <a:r>
+              <a:rPr lang="ru-RU" sz="1800" b="0" i="0" u="none" strike="noStrike" dirty="0">
+                <a:solidFill>
+                  <a:srgbClr val="595959"/>
+                </a:solidFill>
+                <a:effectLst/>
+                <a:latin typeface="Arial" panose="020B0604020202020204" pitchFamily="34" charset="0"/>
+              </a:rPr>
+              <a:t>)</a:t>
+            </a:r>
+          </a:p>
+          <a:p>
+            <a:pPr rtl="0" fontAlgn="base">
+              <a:buFont typeface="Arial" panose="020B0604020202020204" pitchFamily="34" charset="0"/>
+              <a:buChar char="•"/>
+            </a:pPr>
+            <a:r>
+              <a:rPr lang="ru-RU" sz="1800" b="0" i="0" u="none" strike="noStrike" dirty="0">
+                <a:solidFill>
+                  <a:srgbClr val="595959"/>
+                </a:solidFill>
+                <a:effectLst/>
+                <a:latin typeface="Arial" panose="020B0604020202020204" pitchFamily="34" charset="0"/>
+              </a:rPr>
+              <a:t>Ряд в грядке – </a:t>
+            </a:r>
+            <a:r>
+              <a:rPr lang="ru-RU" sz="1800" b="1" i="0" u="none" strike="noStrike" dirty="0" err="1">
+                <a:solidFill>
+                  <a:srgbClr val="595959"/>
+                </a:solidFill>
+                <a:effectLst/>
+                <a:latin typeface="Arial" panose="020B0604020202020204" pitchFamily="34" charset="0"/>
+              </a:rPr>
+              <a:t>warp</a:t>
+            </a:r>
+            <a:r>
+              <a:rPr lang="en-US" sz="1800" b="1" i="0" u="none" strike="noStrike" dirty="0">
+                <a:solidFill>
+                  <a:srgbClr val="595959"/>
+                </a:solidFill>
+                <a:effectLst/>
+                <a:latin typeface="Arial" panose="020B0604020202020204" pitchFamily="34" charset="0"/>
+              </a:rPr>
+              <a:t> (32 threads)</a:t>
+            </a:r>
+            <a:endParaRPr lang="ru-RU" sz="1800" b="1" i="0" u="none" strike="noStrike" dirty="0">
+              <a:solidFill>
+                <a:srgbClr val="595959"/>
+              </a:solidFill>
+              <a:effectLst/>
+              <a:latin typeface="Arial" panose="020B0604020202020204" pitchFamily="34" charset="0"/>
+            </a:endParaRPr>
+          </a:p>
+          <a:p>
+            <a:pPr rtl="0" fontAlgn="base">
+              <a:spcAft>
+                <a:spcPts val="1600"/>
+              </a:spcAft>
+              <a:buFont typeface="Arial" panose="020B0604020202020204" pitchFamily="34" charset="0"/>
+              <a:buChar char="•"/>
+            </a:pPr>
+            <a:r>
+              <a:rPr lang="ru-RU" sz="1800" b="0" i="0" u="none" strike="noStrike" dirty="0">
+                <a:solidFill>
+                  <a:srgbClr val="595959"/>
+                </a:solidFill>
+                <a:effectLst/>
+                <a:latin typeface="Arial" panose="020B0604020202020204" pitchFamily="34" charset="0"/>
+              </a:rPr>
+              <a:t>Грядка – </a:t>
+            </a:r>
+            <a:r>
+              <a:rPr lang="ru-RU" dirty="0">
+                <a:solidFill>
+                  <a:srgbClr val="595959"/>
+                </a:solidFill>
+                <a:latin typeface="Arial" panose="020B0604020202020204" pitchFamily="34" charset="0"/>
+              </a:rPr>
+              <a:t>блок (</a:t>
+            </a:r>
+            <a:r>
+              <a:rPr lang="ru-RU" sz="1800" b="0" i="0" u="none" strike="noStrike" dirty="0" err="1">
+                <a:solidFill>
+                  <a:srgbClr val="595959"/>
+                </a:solidFill>
+                <a:effectLst/>
+                <a:latin typeface="Arial" panose="020B0604020202020204" pitchFamily="34" charset="0"/>
+              </a:rPr>
+              <a:t>block</a:t>
+            </a:r>
+            <a:r>
+              <a:rPr lang="ru-RU" dirty="0">
+                <a:solidFill>
+                  <a:srgbClr val="595959"/>
+                </a:solidFill>
+                <a:latin typeface="Arial" panose="020B0604020202020204" pitchFamily="34" charset="0"/>
+              </a:rPr>
+              <a:t>)</a:t>
+            </a:r>
+            <a:endParaRPr lang="ru-RU" sz="1800" b="0" i="0" u="none" strike="noStrike" dirty="0">
+              <a:solidFill>
+                <a:srgbClr val="595959"/>
+              </a:solidFill>
+              <a:effectLst/>
+              <a:latin typeface="Arial" panose="020B0604020202020204" pitchFamily="34" charset="0"/>
+            </a:endParaRPr>
+          </a:p>
+          <a:p>
+            <a:pPr rtl="0" fontAlgn="base">
+              <a:buFont typeface="Arial" panose="020B0604020202020204" pitchFamily="34" charset="0"/>
+              <a:buChar char="•"/>
+            </a:pPr>
+            <a:r>
+              <a:rPr lang="ru-RU" sz="1800" b="0" i="0" u="none" strike="noStrike" dirty="0">
+                <a:solidFill>
+                  <a:srgbClr val="595959"/>
+                </a:solidFill>
+                <a:effectLst/>
+                <a:latin typeface="Arial" panose="020B0604020202020204" pitchFamily="34" charset="0"/>
+              </a:rPr>
+              <a:t>Ряд из грядок – сетка (</a:t>
+            </a:r>
+            <a:r>
+              <a:rPr lang="ru-RU" sz="1800" b="0" i="0" u="none" strike="noStrike" dirty="0" err="1">
+                <a:solidFill>
+                  <a:srgbClr val="595959"/>
+                </a:solidFill>
+                <a:effectLst/>
+                <a:latin typeface="Arial" panose="020B0604020202020204" pitchFamily="34" charset="0"/>
+              </a:rPr>
+              <a:t>grid</a:t>
+            </a:r>
+            <a:r>
+              <a:rPr lang="ru-RU" sz="1800" b="0" i="0" u="none" strike="noStrike" dirty="0">
+                <a:solidFill>
+                  <a:srgbClr val="595959"/>
+                </a:solidFill>
+                <a:effectLst/>
+                <a:latin typeface="Arial" panose="020B0604020202020204" pitchFamily="34" charset="0"/>
+              </a:rPr>
+              <a:t>)</a:t>
+            </a:r>
+          </a:p>
+        </p:txBody>
+      </p:sp>
+    </p:spTree>
+    <p:extLst>
+      <p:ext uri="{BB962C8B-B14F-4D97-AF65-F5344CB8AC3E}">
+        <p14:creationId xmlns:p14="http://schemas.microsoft.com/office/powerpoint/2010/main" val="2935644586"/>
+      </p:ext>
+    </p:extLst>
+  </p:cSld>
+  <p:clrMapOvr>
+    <a:masterClrMapping/>
+  </p:clrMapOvr>
+</p:sld>
+</file>
+
+<file path=ppt/slides/slide15.xml><?xml version="1.0" encoding="utf-8"?>
+<p:sld xmlns:a="http://schemas.openxmlformats.org/drawingml/2006/main" xmlns:r="http://schemas.openxmlformats.org/officeDocument/2006/relationships" xmlns:p="http://schemas.openxmlformats.org/presentationml/2006/main">
+  <p:cSld>
+    <p:spTree>
+      <p:nvGrpSpPr>
+        <p:cNvPr id="1" name=""/>
+        <p:cNvGrpSpPr/>
+        <p:nvPr/>
+      </p:nvGrpSpPr>
+      <p:grpSpPr>
+        <a:xfrm>
+          <a:off x="0" y="0"/>
+          <a:ext cx="0" cy="0"/>
+          <a:chOff x="0" y="0"/>
+          <a:chExt cx="0" cy="0"/>
+        </a:xfrm>
+      </p:grpSpPr>
+      <p:sp>
+        <p:nvSpPr>
+          <p:cNvPr id="2" name="Заголовок 1">
+            <a:extLst>
+              <a:ext uri="{FF2B5EF4-FFF2-40B4-BE49-F238E27FC236}">
+                <a16:creationId xmlns:a16="http://schemas.microsoft.com/office/drawing/2014/main" id="{7D206911-5DFE-3ACC-D1D1-412C4408B10A}"/>
+              </a:ext>
+            </a:extLst>
+          </p:cNvPr>
+          <p:cNvSpPr>
+            <a:spLocks noGrp="1"/>
+          </p:cNvSpPr>
+          <p:nvPr>
+            <p:ph type="title"/>
+          </p:nvPr>
+        </p:nvSpPr>
+        <p:spPr/>
+        <p:txBody>
+          <a:bodyPr/>
+          <a:lstStyle/>
+          <a:p>
+            <a:r>
+              <a:rPr lang="ru-RU" dirty="0"/>
+              <a:t>Основные концепции программирования на </a:t>
+            </a:r>
+            <a:r>
+              <a:rPr lang="en-US" dirty="0"/>
+              <a:t>OpenCL </a:t>
+            </a:r>
+            <a:r>
+              <a:rPr lang="ru-RU" dirty="0"/>
+              <a:t>и </a:t>
+            </a:r>
+            <a:r>
+              <a:rPr lang="en-US" dirty="0"/>
+              <a:t>CUDA</a:t>
+            </a:r>
+            <a:endParaRPr lang="ru-RU" dirty="0"/>
+          </a:p>
+        </p:txBody>
+      </p:sp>
+      <p:sp>
+        <p:nvSpPr>
+          <p:cNvPr id="3" name="Объект 2">
+            <a:extLst>
+              <a:ext uri="{FF2B5EF4-FFF2-40B4-BE49-F238E27FC236}">
+                <a16:creationId xmlns:a16="http://schemas.microsoft.com/office/drawing/2014/main" id="{167BF300-5622-9EAD-614E-B67BC00477F2}"/>
+              </a:ext>
+            </a:extLst>
+          </p:cNvPr>
+          <p:cNvSpPr>
+            <a:spLocks noGrp="1"/>
+          </p:cNvSpPr>
+          <p:nvPr>
+            <p:ph idx="1"/>
+          </p:nvPr>
+        </p:nvSpPr>
+        <p:spPr/>
+        <p:txBody>
+          <a:bodyPr>
+            <a:normAutofit lnSpcReduction="10000"/>
+          </a:bodyPr>
+          <a:lstStyle/>
+          <a:p>
+            <a:r>
+              <a:rPr lang="ru-RU" dirty="0"/>
+              <a:t>Код выполняется отдельно на </a:t>
+            </a:r>
+            <a:r>
+              <a:rPr lang="ru-RU" b="1" dirty="0"/>
+              <a:t>хосте (</a:t>
+            </a:r>
+            <a:r>
+              <a:rPr lang="en-US" b="1" dirty="0"/>
+              <a:t>host)</a:t>
+            </a:r>
+            <a:r>
+              <a:rPr lang="ru-RU" b="1" dirty="0"/>
+              <a:t> </a:t>
+            </a:r>
+            <a:r>
+              <a:rPr lang="ru-RU" dirty="0"/>
+              <a:t>и отдельно на </a:t>
+            </a:r>
+            <a:r>
+              <a:rPr lang="ru-RU" b="1" dirty="0"/>
+              <a:t>устройстве</a:t>
+            </a:r>
+            <a:r>
+              <a:rPr lang="en-US" b="1" dirty="0"/>
+              <a:t> (device)</a:t>
+            </a:r>
+            <a:endParaRPr lang="ru-RU" b="1" dirty="0"/>
+          </a:p>
+          <a:p>
+            <a:r>
+              <a:rPr lang="ru-RU" dirty="0"/>
+              <a:t>Создание </a:t>
+            </a:r>
+            <a:r>
+              <a:rPr lang="en-US" dirty="0"/>
+              <a:t>“</a:t>
+            </a:r>
+            <a:r>
+              <a:rPr lang="ru-RU" dirty="0"/>
+              <a:t>окружения</a:t>
+            </a:r>
+            <a:r>
+              <a:rPr lang="en-US" dirty="0"/>
+              <a:t>”</a:t>
+            </a:r>
+            <a:r>
+              <a:rPr lang="ru-RU" dirty="0"/>
+              <a:t> для работы кода (платформа, контекст, очереди и др.)</a:t>
+            </a:r>
+          </a:p>
+          <a:p>
+            <a:r>
+              <a:rPr lang="ru-RU" b="1" dirty="0"/>
+              <a:t>Выделение памяти </a:t>
+            </a:r>
+            <a:r>
+              <a:rPr lang="ru-RU" dirty="0"/>
+              <a:t>на хосте и устройстве, </a:t>
+            </a:r>
+            <a:r>
+              <a:rPr lang="ru-RU" b="1" dirty="0"/>
+              <a:t>копирование</a:t>
+            </a:r>
+            <a:r>
+              <a:rPr lang="ru-RU" dirty="0"/>
+              <a:t> данных с хоста на устройство </a:t>
+            </a:r>
+          </a:p>
+          <a:p>
+            <a:r>
+              <a:rPr lang="ru-RU" b="1" dirty="0"/>
+              <a:t>Выполнение ядра</a:t>
+            </a:r>
+          </a:p>
+          <a:p>
+            <a:r>
+              <a:rPr lang="ru-RU" b="1" dirty="0"/>
+              <a:t>Копирование результатов</a:t>
+            </a:r>
+            <a:r>
+              <a:rPr lang="ru-RU" dirty="0"/>
+              <a:t> ядра на хост</a:t>
+            </a:r>
+          </a:p>
+          <a:p>
+            <a:r>
+              <a:rPr lang="ru-RU" b="1" dirty="0"/>
+              <a:t>Удаление</a:t>
+            </a:r>
+            <a:r>
+              <a:rPr lang="ru-RU" dirty="0"/>
+              <a:t> всех созданных сущностей, чтобы не было утечек памяти</a:t>
+            </a:r>
+          </a:p>
+        </p:txBody>
+      </p:sp>
+    </p:spTree>
+    <p:extLst>
+      <p:ext uri="{BB962C8B-B14F-4D97-AF65-F5344CB8AC3E}">
+        <p14:creationId xmlns:p14="http://schemas.microsoft.com/office/powerpoint/2010/main" val="1289891704"/>
+      </p:ext>
+    </p:extLst>
+  </p:cSld>
+  <p:clrMapOvr>
+    <a:masterClrMapping/>
+  </p:clrMapOvr>
+</p:sld>
+</file>
+
+<file path=ppt/slides/slide16.xml><?xml version="1.0" encoding="utf-8"?>
+<p:sld xmlns:a="http://schemas.openxmlformats.org/drawingml/2006/main" xmlns:r="http://schemas.openxmlformats.org/officeDocument/2006/relationships" xmlns:p="http://schemas.openxmlformats.org/presentationml/2006/main">
+  <p:cSld>
+    <p:spTree>
+      <p:nvGrpSpPr>
+        <p:cNvPr id="1" name=""/>
+        <p:cNvGrpSpPr/>
+        <p:nvPr/>
+      </p:nvGrpSpPr>
+      <p:grpSpPr>
+        <a:xfrm>
+          <a:off x="0" y="0"/>
+          <a:ext cx="0" cy="0"/>
+          <a:chOff x="0" y="0"/>
+          <a:chExt cx="0" cy="0"/>
+        </a:xfrm>
+      </p:grpSpPr>
+      <p:sp>
+        <p:nvSpPr>
+          <p:cNvPr id="2" name="Заголовок 1">
+            <a:extLst>
+              <a:ext uri="{FF2B5EF4-FFF2-40B4-BE49-F238E27FC236}">
+                <a16:creationId xmlns:a16="http://schemas.microsoft.com/office/drawing/2014/main" id="{905A417C-D0EE-88B2-C2B2-1939BEC78E54}"/>
+              </a:ext>
+            </a:extLst>
+          </p:cNvPr>
+          <p:cNvSpPr>
+            <a:spLocks noGrp="1"/>
+          </p:cNvSpPr>
+          <p:nvPr>
+            <p:ph type="title"/>
+          </p:nvPr>
+        </p:nvSpPr>
+        <p:spPr/>
+        <p:txBody>
+          <a:bodyPr/>
+          <a:lstStyle/>
+          <a:p>
+            <a:r>
+              <a:rPr lang="ru-RU" dirty="0"/>
+              <a:t>Примеры кода на </a:t>
+            </a:r>
+            <a:r>
+              <a:rPr lang="en-US" dirty="0"/>
+              <a:t>OpenCL</a:t>
+            </a:r>
+            <a:r>
+              <a:rPr lang="ru-RU" dirty="0"/>
+              <a:t> (ядро)</a:t>
+            </a:r>
+          </a:p>
+        </p:txBody>
+      </p:sp>
+      <p:sp>
+        <p:nvSpPr>
+          <p:cNvPr id="3" name="Объект 2">
+            <a:extLst>
+              <a:ext uri="{FF2B5EF4-FFF2-40B4-BE49-F238E27FC236}">
+                <a16:creationId xmlns:a16="http://schemas.microsoft.com/office/drawing/2014/main" id="{1AEDF341-44E9-DFB0-4508-160E9B4260E2}"/>
+              </a:ext>
+            </a:extLst>
+          </p:cNvPr>
+          <p:cNvSpPr>
+            <a:spLocks noGrp="1"/>
+          </p:cNvSpPr>
+          <p:nvPr>
+            <p:ph idx="1"/>
+          </p:nvPr>
+        </p:nvSpPr>
+        <p:spPr/>
+        <p:txBody>
+          <a:bodyPr/>
+          <a:lstStyle/>
+          <a:p>
+            <a:endParaRPr lang="ru-RU" dirty="0"/>
+          </a:p>
+        </p:txBody>
+      </p:sp>
+      <p:pic>
+        <p:nvPicPr>
+          <p:cNvPr id="7" name="Рисунок 6">
+            <a:extLst>
+              <a:ext uri="{FF2B5EF4-FFF2-40B4-BE49-F238E27FC236}">
+                <a16:creationId xmlns:a16="http://schemas.microsoft.com/office/drawing/2014/main" id="{929AC0A3-7904-375B-A4EC-0E86AD8270E5}"/>
+              </a:ext>
+            </a:extLst>
+          </p:cNvPr>
+          <p:cNvPicPr>
+            <a:picLocks noChangeAspect="1"/>
+          </p:cNvPicPr>
+          <p:nvPr/>
+        </p:nvPicPr>
+        <p:blipFill>
+          <a:blip r:embed="rId2"/>
+          <a:stretch>
+            <a:fillRect/>
+          </a:stretch>
+        </p:blipFill>
+        <p:spPr>
+          <a:xfrm>
+            <a:off x="1202171" y="2640589"/>
+            <a:ext cx="9787657" cy="1576822"/>
+          </a:xfrm>
+          <a:prstGeom prst="rect">
+            <a:avLst/>
+          </a:prstGeom>
+        </p:spPr>
+      </p:pic>
+    </p:spTree>
+    <p:extLst>
+      <p:ext uri="{BB962C8B-B14F-4D97-AF65-F5344CB8AC3E}">
+        <p14:creationId xmlns:p14="http://schemas.microsoft.com/office/powerpoint/2010/main" val="2936340279"/>
+      </p:ext>
+    </p:extLst>
+  </p:cSld>
+  <p:clrMapOvr>
+    <a:masterClrMapping/>
+  </p:clrMapOvr>
+</p:sld>
+</file>
+
+<file path=ppt/slides/slide17.xml><?xml version="1.0" encoding="utf-8"?>
+<p:sld xmlns:a="http://schemas.openxmlformats.org/drawingml/2006/main" xmlns:r="http://schemas.openxmlformats.org/officeDocument/2006/relationships" xmlns:p="http://schemas.openxmlformats.org/presentationml/2006/main">
+  <p:cSld>
+    <p:spTree>
+      <p:nvGrpSpPr>
+        <p:cNvPr id="1" name=""/>
+        <p:cNvGrpSpPr/>
+        <p:nvPr/>
+      </p:nvGrpSpPr>
+      <p:grpSpPr>
+        <a:xfrm>
+          <a:off x="0" y="0"/>
+          <a:ext cx="0" cy="0"/>
+          <a:chOff x="0" y="0"/>
+          <a:chExt cx="0" cy="0"/>
+        </a:xfrm>
+      </p:grpSpPr>
+      <p:sp>
+        <p:nvSpPr>
+          <p:cNvPr id="2" name="Заголовок 1">
+            <a:extLst>
+              <a:ext uri="{FF2B5EF4-FFF2-40B4-BE49-F238E27FC236}">
+                <a16:creationId xmlns:a16="http://schemas.microsoft.com/office/drawing/2014/main" id="{CABF5A93-78B2-7E56-E696-53704A26135E}"/>
+              </a:ext>
+            </a:extLst>
+          </p:cNvPr>
+          <p:cNvSpPr>
+            <a:spLocks noGrp="1"/>
+          </p:cNvSpPr>
+          <p:nvPr>
+            <p:ph type="title"/>
+          </p:nvPr>
+        </p:nvSpPr>
+        <p:spPr/>
+        <p:txBody>
+          <a:bodyPr/>
+          <a:lstStyle/>
+          <a:p>
+            <a:r>
+              <a:rPr lang="ru-RU" dirty="0"/>
+              <a:t>Примеры кода на </a:t>
+            </a:r>
+            <a:r>
+              <a:rPr lang="en-US" dirty="0"/>
+              <a:t>OpenCL</a:t>
+            </a:r>
+            <a:r>
+              <a:rPr lang="ru-RU" dirty="0"/>
+              <a:t> (хост)</a:t>
+            </a:r>
+          </a:p>
+        </p:txBody>
+      </p:sp>
+      <p:sp>
+        <p:nvSpPr>
+          <p:cNvPr id="3" name="Объект 2">
+            <a:extLst>
+              <a:ext uri="{FF2B5EF4-FFF2-40B4-BE49-F238E27FC236}">
+                <a16:creationId xmlns:a16="http://schemas.microsoft.com/office/drawing/2014/main" id="{45A0B7F0-55D5-080A-37EA-94B980F43857}"/>
+              </a:ext>
+            </a:extLst>
+          </p:cNvPr>
+          <p:cNvSpPr>
+            <a:spLocks noGrp="1"/>
+          </p:cNvSpPr>
+          <p:nvPr>
+            <p:ph idx="1"/>
+          </p:nvPr>
+        </p:nvSpPr>
+        <p:spPr/>
+        <p:txBody>
+          <a:bodyPr/>
+          <a:lstStyle/>
+          <a:p>
+            <a:endParaRPr lang="ru-RU" dirty="0"/>
+          </a:p>
+        </p:txBody>
+      </p:sp>
+      <p:pic>
+        <p:nvPicPr>
+          <p:cNvPr id="5" name="Рисунок 4">
+            <a:extLst>
+              <a:ext uri="{FF2B5EF4-FFF2-40B4-BE49-F238E27FC236}">
+                <a16:creationId xmlns:a16="http://schemas.microsoft.com/office/drawing/2014/main" id="{01DA5B13-95E8-AA56-30DB-3A73FEAAB068}"/>
+              </a:ext>
+            </a:extLst>
+          </p:cNvPr>
+          <p:cNvPicPr>
+            <a:picLocks noChangeAspect="1"/>
+          </p:cNvPicPr>
+          <p:nvPr/>
+        </p:nvPicPr>
+        <p:blipFill>
+          <a:blip r:embed="rId2"/>
+          <a:stretch>
+            <a:fillRect/>
+          </a:stretch>
+        </p:blipFill>
+        <p:spPr>
+          <a:xfrm>
+            <a:off x="2767974" y="1257711"/>
+            <a:ext cx="6811326" cy="5487166"/>
+          </a:xfrm>
+          <a:prstGeom prst="rect">
+            <a:avLst/>
+          </a:prstGeom>
+        </p:spPr>
+      </p:pic>
+    </p:spTree>
+    <p:extLst>
+      <p:ext uri="{BB962C8B-B14F-4D97-AF65-F5344CB8AC3E}">
+        <p14:creationId xmlns:p14="http://schemas.microsoft.com/office/powerpoint/2010/main" val="1358772111"/>
+      </p:ext>
+    </p:extLst>
+  </p:cSld>
+  <p:clrMapOvr>
+    <a:masterClrMapping/>
+  </p:clrMapOvr>
+</p:sld>
+</file>
+
+<file path=ppt/slides/slide18.xml><?xml version="1.0" encoding="utf-8"?>
+<p:sld xmlns:a="http://schemas.openxmlformats.org/drawingml/2006/main" xmlns:r="http://schemas.openxmlformats.org/officeDocument/2006/relationships" xmlns:p="http://schemas.openxmlformats.org/presentationml/2006/main">
+  <p:cSld>
+    <p:spTree>
+      <p:nvGrpSpPr>
+        <p:cNvPr id="1" name=""/>
+        <p:cNvGrpSpPr/>
+        <p:nvPr/>
+      </p:nvGrpSpPr>
+      <p:grpSpPr>
+        <a:xfrm>
+          <a:off x="0" y="0"/>
+          <a:ext cx="0" cy="0"/>
+          <a:chOff x="0" y="0"/>
+          <a:chExt cx="0" cy="0"/>
+        </a:xfrm>
+      </p:grpSpPr>
+      <p:sp>
+        <p:nvSpPr>
+          <p:cNvPr id="2" name="Заголовок 1">
+            <a:extLst>
+              <a:ext uri="{FF2B5EF4-FFF2-40B4-BE49-F238E27FC236}">
+                <a16:creationId xmlns:a16="http://schemas.microsoft.com/office/drawing/2014/main" id="{7F400821-8FF5-3C3A-1BAB-8F78C630EB52}"/>
+              </a:ext>
+            </a:extLst>
+          </p:cNvPr>
+          <p:cNvSpPr>
+            <a:spLocks noGrp="1"/>
+          </p:cNvSpPr>
+          <p:nvPr>
+            <p:ph type="title"/>
+          </p:nvPr>
+        </p:nvSpPr>
+        <p:spPr/>
+        <p:txBody>
+          <a:bodyPr/>
+          <a:lstStyle/>
+          <a:p>
+            <a:r>
+              <a:rPr lang="ru-RU" dirty="0"/>
+              <a:t>Примеры кода на </a:t>
+            </a:r>
+            <a:r>
+              <a:rPr lang="en-US" dirty="0"/>
+              <a:t>OpenCL </a:t>
+            </a:r>
+            <a:r>
+              <a:rPr lang="ru-RU" dirty="0"/>
+              <a:t>(хост)</a:t>
+            </a:r>
+          </a:p>
+        </p:txBody>
+      </p:sp>
+      <p:pic>
+        <p:nvPicPr>
+          <p:cNvPr id="5" name="Объект 4">
+            <a:extLst>
+              <a:ext uri="{FF2B5EF4-FFF2-40B4-BE49-F238E27FC236}">
+                <a16:creationId xmlns:a16="http://schemas.microsoft.com/office/drawing/2014/main" id="{5A99B790-EF6F-59B3-0923-0B984A6F7BBC}"/>
+              </a:ext>
+            </a:extLst>
+          </p:cNvPr>
+          <p:cNvPicPr>
+            <a:picLocks noGrp="1" noChangeAspect="1"/>
+          </p:cNvPicPr>
+          <p:nvPr>
+            <p:ph idx="1"/>
+          </p:nvPr>
+        </p:nvPicPr>
+        <p:blipFill>
+          <a:blip r:embed="rId2"/>
+          <a:stretch>
+            <a:fillRect/>
+          </a:stretch>
+        </p:blipFill>
+        <p:spPr>
+          <a:xfrm>
+            <a:off x="2687807" y="1423358"/>
+            <a:ext cx="6816385" cy="5434642"/>
+          </a:xfrm>
+        </p:spPr>
+      </p:pic>
+    </p:spTree>
+    <p:extLst>
+      <p:ext uri="{BB962C8B-B14F-4D97-AF65-F5344CB8AC3E}">
+        <p14:creationId xmlns:p14="http://schemas.microsoft.com/office/powerpoint/2010/main" val="1940199063"/>
+      </p:ext>
+    </p:extLst>
+  </p:cSld>
+  <p:clrMapOvr>
+    <a:masterClrMapping/>
+  </p:clrMapOvr>
+</p:sld>
+</file>
+
+<file path=ppt/slides/slide19.xml><?xml version="1.0" encoding="utf-8"?>
+<p:sld xmlns:a="http://schemas.openxmlformats.org/drawingml/2006/main" xmlns:r="http://schemas.openxmlformats.org/officeDocument/2006/relationships" xmlns:p="http://schemas.openxmlformats.org/presentationml/2006/main">
+  <p:cSld>
+    <p:spTree>
+      <p:nvGrpSpPr>
+        <p:cNvPr id="1" name=""/>
+        <p:cNvGrpSpPr/>
+        <p:nvPr/>
+      </p:nvGrpSpPr>
+      <p:grpSpPr>
+        <a:xfrm>
+          <a:off x="0" y="0"/>
+          <a:ext cx="0" cy="0"/>
+          <a:chOff x="0" y="0"/>
+          <a:chExt cx="0" cy="0"/>
+        </a:xfrm>
+      </p:grpSpPr>
+      <p:sp>
+        <p:nvSpPr>
+          <p:cNvPr id="2" name="Заголовок 1">
+            <a:extLst>
+              <a:ext uri="{FF2B5EF4-FFF2-40B4-BE49-F238E27FC236}">
+                <a16:creationId xmlns:a16="http://schemas.microsoft.com/office/drawing/2014/main" id="{0A998428-D52D-F440-F712-45ABA7ADB2B1}"/>
+              </a:ext>
+            </a:extLst>
+          </p:cNvPr>
+          <p:cNvSpPr>
+            <a:spLocks noGrp="1"/>
+          </p:cNvSpPr>
+          <p:nvPr>
+            <p:ph type="title"/>
+          </p:nvPr>
+        </p:nvSpPr>
+        <p:spPr/>
+        <p:txBody>
+          <a:bodyPr/>
+          <a:lstStyle/>
+          <a:p>
+            <a:r>
+              <a:rPr lang="ru-RU" dirty="0"/>
+              <a:t>Примеры кода на </a:t>
+            </a:r>
+            <a:r>
+              <a:rPr lang="en-US" dirty="0"/>
+              <a:t>CUDA</a:t>
+            </a:r>
+            <a:r>
+              <a:rPr lang="ru-RU" dirty="0"/>
+              <a:t> (ядро)</a:t>
+            </a:r>
+          </a:p>
+        </p:txBody>
+      </p:sp>
+      <p:pic>
+        <p:nvPicPr>
+          <p:cNvPr id="5" name="Объект 4">
+            <a:extLst>
+              <a:ext uri="{FF2B5EF4-FFF2-40B4-BE49-F238E27FC236}">
+                <a16:creationId xmlns:a16="http://schemas.microsoft.com/office/drawing/2014/main" id="{41CD7517-3225-C943-A726-828FB32A9C4D}"/>
+              </a:ext>
+            </a:extLst>
+          </p:cNvPr>
+          <p:cNvPicPr>
+            <a:picLocks noGrp="1" noChangeAspect="1"/>
+          </p:cNvPicPr>
+          <p:nvPr>
+            <p:ph idx="1"/>
+          </p:nvPr>
+        </p:nvPicPr>
+        <p:blipFill>
+          <a:blip r:embed="rId2"/>
+          <a:stretch>
+            <a:fillRect/>
+          </a:stretch>
+        </p:blipFill>
+        <p:spPr>
+          <a:xfrm>
+            <a:off x="1682577" y="2853808"/>
+            <a:ext cx="8826846" cy="1606049"/>
+          </a:xfrm>
+        </p:spPr>
+      </p:pic>
+    </p:spTree>
+    <p:extLst>
+      <p:ext uri="{BB962C8B-B14F-4D97-AF65-F5344CB8AC3E}">
+        <p14:creationId xmlns:p14="http://schemas.microsoft.com/office/powerpoint/2010/main" val="3514211409"/>
       </p:ext>
     </p:extLst>
   </p:cSld>
@@ -3523,6 +5559,196 @@
     <p:extLst>
       <p:ext uri="{BB962C8B-B14F-4D97-AF65-F5344CB8AC3E}">
         <p14:creationId xmlns:p14="http://schemas.microsoft.com/office/powerpoint/2010/main" val="2038358652"/>
+      </p:ext>
+    </p:extLst>
+  </p:cSld>
+  <p:clrMapOvr>
+    <a:masterClrMapping/>
+  </p:clrMapOvr>
+</p:sld>
+</file>
+
+<file path=ppt/slides/slide20.xml><?xml version="1.0" encoding="utf-8"?>
+<p:sld xmlns:a="http://schemas.openxmlformats.org/drawingml/2006/main" xmlns:r="http://schemas.openxmlformats.org/officeDocument/2006/relationships" xmlns:p="http://schemas.openxmlformats.org/presentationml/2006/main">
+  <p:cSld>
+    <p:spTree>
+      <p:nvGrpSpPr>
+        <p:cNvPr id="1" name=""/>
+        <p:cNvGrpSpPr/>
+        <p:nvPr/>
+      </p:nvGrpSpPr>
+      <p:grpSpPr>
+        <a:xfrm>
+          <a:off x="0" y="0"/>
+          <a:ext cx="0" cy="0"/>
+          <a:chOff x="0" y="0"/>
+          <a:chExt cx="0" cy="0"/>
+        </a:xfrm>
+      </p:grpSpPr>
+      <p:sp>
+        <p:nvSpPr>
+          <p:cNvPr id="2" name="Заголовок 1">
+            <a:extLst>
+              <a:ext uri="{FF2B5EF4-FFF2-40B4-BE49-F238E27FC236}">
+                <a16:creationId xmlns:a16="http://schemas.microsoft.com/office/drawing/2014/main" id="{C8AEF928-4208-2412-1FF8-A959EF14D678}"/>
+              </a:ext>
+            </a:extLst>
+          </p:cNvPr>
+          <p:cNvSpPr>
+            <a:spLocks noGrp="1"/>
+          </p:cNvSpPr>
+          <p:nvPr>
+            <p:ph type="title"/>
+          </p:nvPr>
+        </p:nvSpPr>
+        <p:spPr/>
+        <p:txBody>
+          <a:bodyPr/>
+          <a:lstStyle/>
+          <a:p>
+            <a:r>
+              <a:rPr lang="ru-RU" dirty="0"/>
+              <a:t>Примеры кода на </a:t>
+            </a:r>
+            <a:r>
+              <a:rPr lang="en-US" dirty="0"/>
+              <a:t>CUDA </a:t>
+            </a:r>
+            <a:r>
+              <a:rPr lang="ru-RU" dirty="0"/>
+              <a:t>(хост)</a:t>
+            </a:r>
+          </a:p>
+        </p:txBody>
+      </p:sp>
+      <p:pic>
+        <p:nvPicPr>
+          <p:cNvPr id="5" name="Объект 4">
+            <a:extLst>
+              <a:ext uri="{FF2B5EF4-FFF2-40B4-BE49-F238E27FC236}">
+                <a16:creationId xmlns:a16="http://schemas.microsoft.com/office/drawing/2014/main" id="{48CF970A-DB23-2B1F-8A25-221F0B3FA315}"/>
+              </a:ext>
+            </a:extLst>
+          </p:cNvPr>
+          <p:cNvPicPr>
+            <a:picLocks noGrp="1" noChangeAspect="1"/>
+          </p:cNvPicPr>
+          <p:nvPr>
+            <p:ph idx="1"/>
+          </p:nvPr>
+        </p:nvPicPr>
+        <p:blipFill>
+          <a:blip r:embed="rId2"/>
+          <a:stretch>
+            <a:fillRect/>
+          </a:stretch>
+        </p:blipFill>
+        <p:spPr>
+          <a:xfrm>
+            <a:off x="2575167" y="1325293"/>
+            <a:ext cx="7041666" cy="5317976"/>
+          </a:xfrm>
+        </p:spPr>
+      </p:pic>
+    </p:spTree>
+    <p:extLst>
+      <p:ext uri="{BB962C8B-B14F-4D97-AF65-F5344CB8AC3E}">
+        <p14:creationId xmlns:p14="http://schemas.microsoft.com/office/powerpoint/2010/main" val="3413183822"/>
+      </p:ext>
+    </p:extLst>
+  </p:cSld>
+  <p:clrMapOvr>
+    <a:masterClrMapping/>
+  </p:clrMapOvr>
+</p:sld>
+</file>
+
+<file path=ppt/slides/slide21.xml><?xml version="1.0" encoding="utf-8"?>
+<p:sld xmlns:a="http://schemas.openxmlformats.org/drawingml/2006/main" xmlns:r="http://schemas.openxmlformats.org/officeDocument/2006/relationships" xmlns:p="http://schemas.openxmlformats.org/presentationml/2006/main">
+  <p:cSld>
+    <p:spTree>
+      <p:nvGrpSpPr>
+        <p:cNvPr id="1" name=""/>
+        <p:cNvGrpSpPr/>
+        <p:nvPr/>
+      </p:nvGrpSpPr>
+      <p:grpSpPr>
+        <a:xfrm>
+          <a:off x="0" y="0"/>
+          <a:ext cx="0" cy="0"/>
+          <a:chOff x="0" y="0"/>
+          <a:chExt cx="0" cy="0"/>
+        </a:xfrm>
+      </p:grpSpPr>
+      <p:sp>
+        <p:nvSpPr>
+          <p:cNvPr id="2" name="Заголовок 1">
+            <a:extLst>
+              <a:ext uri="{FF2B5EF4-FFF2-40B4-BE49-F238E27FC236}">
+                <a16:creationId xmlns:a16="http://schemas.microsoft.com/office/drawing/2014/main" id="{1065D559-4D2D-2190-D685-6FFE1238D94E}"/>
+              </a:ext>
+            </a:extLst>
+          </p:cNvPr>
+          <p:cNvSpPr>
+            <a:spLocks noGrp="1"/>
+          </p:cNvSpPr>
+          <p:nvPr>
+            <p:ph type="title"/>
+          </p:nvPr>
+        </p:nvSpPr>
+        <p:spPr/>
+        <p:txBody>
+          <a:bodyPr/>
+          <a:lstStyle/>
+          <a:p>
+            <a:r>
+              <a:rPr lang="ru-RU" dirty="0"/>
+              <a:t>Примеры кода на </a:t>
+            </a:r>
+            <a:r>
+              <a:rPr lang="en-US" dirty="0"/>
+              <a:t>CUDA </a:t>
+            </a:r>
+            <a:r>
+              <a:rPr lang="ru-RU" dirty="0"/>
+              <a:t>(хост)</a:t>
+            </a:r>
+          </a:p>
+        </p:txBody>
+      </p:sp>
+      <p:pic>
+        <p:nvPicPr>
+          <p:cNvPr id="5" name="Объект 4">
+            <a:extLst>
+              <a:ext uri="{FF2B5EF4-FFF2-40B4-BE49-F238E27FC236}">
+                <a16:creationId xmlns:a16="http://schemas.microsoft.com/office/drawing/2014/main" id="{92E5063A-0D7D-91A3-80D3-C5285E2BB29D}"/>
+              </a:ext>
+            </a:extLst>
+          </p:cNvPr>
+          <p:cNvPicPr>
+            <a:picLocks noGrp="1" noChangeAspect="1"/>
+          </p:cNvPicPr>
+          <p:nvPr>
+            <p:ph idx="1"/>
+          </p:nvPr>
+        </p:nvPicPr>
+        <p:blipFill>
+          <a:blip r:embed="rId2"/>
+          <a:stretch>
+            <a:fillRect/>
+          </a:stretch>
+        </p:blipFill>
+        <p:spPr>
+          <a:xfrm>
+            <a:off x="2341925" y="1619511"/>
+            <a:ext cx="7508149" cy="4177069"/>
+          </a:xfrm>
+        </p:spPr>
+      </p:pic>
+    </p:spTree>
+    <p:extLst>
+      <p:ext uri="{BB962C8B-B14F-4D97-AF65-F5344CB8AC3E}">
+        <p14:creationId xmlns:p14="http://schemas.microsoft.com/office/powerpoint/2010/main" val="549868949"/>
       </p:ext>
     </p:extLst>
   </p:cSld>
@@ -4858,6 +7084,128 @@
 </p:sld>
 </file>
 
+<file path=ppt/slides/slide9.xml><?xml version="1.0" encoding="utf-8"?>
+<p:sld xmlns:a="http://schemas.openxmlformats.org/drawingml/2006/main" xmlns:r="http://schemas.openxmlformats.org/officeDocument/2006/relationships" xmlns:p="http://schemas.openxmlformats.org/presentationml/2006/main">
+  <p:cSld>
+    <p:spTree>
+      <p:nvGrpSpPr>
+        <p:cNvPr id="1" name=""/>
+        <p:cNvGrpSpPr/>
+        <p:nvPr/>
+      </p:nvGrpSpPr>
+      <p:grpSpPr>
+        <a:xfrm>
+          <a:off x="0" y="0"/>
+          <a:ext cx="0" cy="0"/>
+          <a:chOff x="0" y="0"/>
+          <a:chExt cx="0" cy="0"/>
+        </a:xfrm>
+      </p:grpSpPr>
+      <p:sp>
+        <p:nvSpPr>
+          <p:cNvPr id="2" name="Заголовок 1">
+            <a:extLst>
+              <a:ext uri="{FF2B5EF4-FFF2-40B4-BE49-F238E27FC236}">
+                <a16:creationId xmlns:a16="http://schemas.microsoft.com/office/drawing/2014/main" id="{3D8B902E-26F6-79C9-3D14-AA095BF18387}"/>
+              </a:ext>
+            </a:extLst>
+          </p:cNvPr>
+          <p:cNvSpPr>
+            <a:spLocks noGrp="1"/>
+          </p:cNvSpPr>
+          <p:nvPr>
+            <p:ph type="title"/>
+          </p:nvPr>
+        </p:nvSpPr>
+        <p:spPr/>
+        <p:txBody>
+          <a:bodyPr/>
+          <a:lstStyle/>
+          <a:p>
+            <a:r>
+              <a:rPr lang="ru-RU" dirty="0"/>
+              <a:t>Обзор </a:t>
+            </a:r>
+            <a:r>
+              <a:rPr lang="ru-RU" dirty="0" err="1"/>
+              <a:t>фрейморков</a:t>
+            </a:r>
+            <a:r>
+              <a:rPr lang="ru-RU" dirty="0"/>
+              <a:t> для работы с </a:t>
+            </a:r>
+            <a:r>
+              <a:rPr lang="en-US" dirty="0"/>
+              <a:t>GPU</a:t>
+            </a:r>
+            <a:endParaRPr lang="ru-RU" dirty="0"/>
+          </a:p>
+        </p:txBody>
+      </p:sp>
+      <p:sp>
+        <p:nvSpPr>
+          <p:cNvPr id="3" name="Объект 2">
+            <a:extLst>
+              <a:ext uri="{FF2B5EF4-FFF2-40B4-BE49-F238E27FC236}">
+                <a16:creationId xmlns:a16="http://schemas.microsoft.com/office/drawing/2014/main" id="{563F50AD-0BA6-2B91-4ED6-C1B24F94C4A6}"/>
+              </a:ext>
+            </a:extLst>
+          </p:cNvPr>
+          <p:cNvSpPr>
+            <a:spLocks noGrp="1"/>
+          </p:cNvSpPr>
+          <p:nvPr>
+            <p:ph idx="1"/>
+          </p:nvPr>
+        </p:nvSpPr>
+        <p:spPr/>
+        <p:txBody>
+          <a:bodyPr>
+            <a:normAutofit/>
+          </a:bodyPr>
+          <a:lstStyle/>
+          <a:p>
+            <a:r>
+              <a:rPr lang="ru-RU" dirty="0"/>
+              <a:t>Фреймворки для работы с GPU — это наборы инструментов и библиотек, которые позволяют программистам использовать вычислительные мощности GPU для выполнения задач, отличных от обработки графики (GPGPU)</a:t>
+            </a:r>
+            <a:endParaRPr lang="en-US" dirty="0"/>
+          </a:p>
+          <a:p>
+            <a:r>
+              <a:rPr lang="ru-RU" dirty="0"/>
+              <a:t>Фреймворки упрощают взаимодействие с GPU, предоставляя высокоуровневые API для управления памятью, выполнения ядер (</a:t>
+            </a:r>
+            <a:r>
+              <a:rPr lang="ru-RU" dirty="0" err="1"/>
+              <a:t>kernels</a:t>
+            </a:r>
+            <a:r>
+              <a:rPr lang="ru-RU" dirty="0"/>
+              <a:t>) и синхронизации.</a:t>
+            </a:r>
+          </a:p>
+          <a:p>
+            <a:r>
+              <a:rPr lang="ru-RU" dirty="0"/>
+              <a:t>Без фреймворков программирование на GPU было бы крайне сложным и требовало бы глубокого понимания аппаратной архитектуры.</a:t>
+            </a:r>
+          </a:p>
+        </p:txBody>
+      </p:sp>
+    </p:spTree>
+    <p:extLst>
+      <p:ext uri="{BB962C8B-B14F-4D97-AF65-F5344CB8AC3E}">
+        <p14:creationId xmlns:p14="http://schemas.microsoft.com/office/powerpoint/2010/main" val="3968877600"/>
+      </p:ext>
+    </p:extLst>
+  </p:cSld>
+  <p:clrMapOvr>
+    <a:masterClrMapping/>
+  </p:clrMapOvr>
+</p:sld>
+</file>
+
 <file path=ppt/theme/theme1.xml><?xml version="1.0" encoding="utf-8"?>
 <a:theme xmlns:a="http://schemas.openxmlformats.org/drawingml/2006/main" name="Тема Office">
   <a:themeElements>

</xml_diff>